<commit_message>
Modify forward propagation page
Modify forward propagation page
</commit_message>
<xml_diff>
--- a/doc/neural_network_for_multilayers.pptx
+++ b/doc/neural_network_for_multilayers.pptx
@@ -3369,8 +3369,8 @@
         </p:nvSpPr>
         <p:spPr>
           <a:xfrm>
-            <a:off x="6054938" y="753880"/>
-            <a:ext cx="292068" cy="230832"/>
+            <a:off x="6054938" y="976266"/>
+            <a:ext cx="272832" cy="230832"/>
           </a:xfrm>
           <a:prstGeom prst="rect">
             <a:avLst/>
@@ -3384,12 +3384,12 @@
           <a:lstStyle/>
           <a:p>
             <a:r>
-              <a:rPr lang="en-US" altLang="ko-KR" sz="900" dirty="0" smtClean="0"/>
+              <a:rPr lang="en-US" altLang="ko-KR" sz="900" dirty="0" err="1" smtClean="0"/>
               <a:t>p</a:t>
             </a:r>
             <a:r>
-              <a:rPr lang="en-US" altLang="ko-KR" sz="900" baseline="-25000" dirty="0" smtClean="0"/>
-              <a:t>k</a:t>
+              <a:rPr lang="en-US" altLang="ko-KR" sz="900" baseline="-25000" dirty="0" err="1" smtClean="0"/>
+              <a:t>l</a:t>
             </a:r>
             <a:endParaRPr lang="ko-KR" altLang="en-US" sz="900" baseline="-25000" dirty="0"/>
           </a:p>
@@ -3403,8 +3403,8 @@
         </p:nvSpPr>
         <p:spPr>
           <a:xfrm>
-            <a:off x="6788385" y="753880"/>
-            <a:ext cx="279244" cy="230832"/>
+            <a:off x="6788385" y="976266"/>
+            <a:ext cx="260008" cy="230832"/>
           </a:xfrm>
           <a:prstGeom prst="rect">
             <a:avLst/>
@@ -3418,12 +3418,12 @@
           <a:lstStyle/>
           <a:p>
             <a:r>
-              <a:rPr lang="en-US" altLang="ko-KR" sz="900" dirty="0" smtClean="0"/>
+              <a:rPr lang="en-US" altLang="ko-KR" sz="900" dirty="0" err="1" smtClean="0"/>
               <a:t>y</a:t>
             </a:r>
             <a:r>
-              <a:rPr lang="en-US" altLang="ko-KR" sz="900" baseline="-25000" dirty="0" smtClean="0"/>
-              <a:t>k</a:t>
+              <a:rPr lang="en-US" altLang="ko-KR" sz="900" baseline="-25000" dirty="0" err="1" smtClean="0"/>
+              <a:t>l</a:t>
             </a:r>
             <a:endParaRPr lang="ko-KR" altLang="en-US" sz="900" baseline="-25000" dirty="0"/>
           </a:p>
@@ -3437,7 +3437,7 @@
         </p:nvSpPr>
         <p:spPr>
           <a:xfrm>
-            <a:off x="720686" y="749550"/>
+            <a:off x="735187" y="1015715"/>
             <a:ext cx="256802" cy="230832"/>
           </a:xfrm>
           <a:prstGeom prst="rect">
@@ -3787,8 +3787,8 @@
           </a:p>
         </p:txBody>
       </p:sp>
-      <mc:AlternateContent xmlns:mc="http://schemas.openxmlformats.org/markup-compatibility/2006">
-        <mc:Choice xmlns:a14="http://schemas.microsoft.com/office/drawing/2010/main" Requires="a14">
+      <mc:AlternateContent xmlns:mc="http://schemas.openxmlformats.org/markup-compatibility/2006" xmlns:a14="http://schemas.microsoft.com/office/drawing/2010/main">
+        <mc:Choice Requires="a14">
           <p:sp>
             <p:nvSpPr>
               <p:cNvPr id="67" name="TextBox 66"/>
@@ -3862,7 +3862,7 @@
             </p:txBody>
           </p:sp>
         </mc:Choice>
-        <mc:Fallback>
+        <mc:Fallback xmlns="">
           <p:sp>
             <p:nvSpPr>
               <p:cNvPr id="67" name="TextBox 66"/>
@@ -4068,7 +4068,7 @@
         <p:spPr>
           <a:xfrm>
             <a:off x="1790538" y="1520788"/>
-            <a:ext cx="871412" cy="0"/>
+            <a:ext cx="434534" cy="0"/>
           </a:xfrm>
           <a:prstGeom prst="straightConnector1">
             <a:avLst/>
@@ -4104,7 +4104,7 @@
         <p:spPr>
           <a:xfrm>
             <a:off x="1790538" y="2240868"/>
-            <a:ext cx="871412" cy="0"/>
+            <a:ext cx="434534" cy="0"/>
           </a:xfrm>
           <a:prstGeom prst="straightConnector1">
             <a:avLst/>
@@ -4140,7 +4140,7 @@
         <p:spPr>
           <a:xfrm>
             <a:off x="1788288" y="4278105"/>
-            <a:ext cx="871412" cy="0"/>
+            <a:ext cx="434534" cy="0"/>
           </a:xfrm>
           <a:prstGeom prst="straightConnector1">
             <a:avLst/>
@@ -4341,13 +4341,15 @@
       <p:cxnSp>
         <p:nvCxnSpPr>
           <p:cNvPr id="100" name="직선 화살표 연결선 99"/>
-          <p:cNvCxnSpPr/>
+          <p:cNvCxnSpPr>
+            <a:stCxn id="143" idx="6"/>
+          </p:cNvCxnSpPr>
           <p:nvPr/>
         </p:nvCxnSpPr>
         <p:spPr>
           <a:xfrm>
-            <a:off x="3944088" y="1520788"/>
-            <a:ext cx="1119371" cy="890"/>
+            <a:off x="4028823" y="1506820"/>
+            <a:ext cx="1034636" cy="14858"/>
           </a:xfrm>
           <a:prstGeom prst="straightConnector1">
             <a:avLst/>
@@ -4375,14 +4377,15 @@
         <p:nvCxnSpPr>
           <p:cNvPr id="101" name="직선 화살표 연결선 100"/>
           <p:cNvCxnSpPr>
+            <a:stCxn id="144" idx="6"/>
             <a:endCxn id="92" idx="2"/>
           </p:cNvCxnSpPr>
           <p:nvPr/>
         </p:nvCxnSpPr>
         <p:spPr>
           <a:xfrm flipV="1">
-            <a:off x="3944088" y="1505634"/>
-            <a:ext cx="1077393" cy="726224"/>
+            <a:off x="4028823" y="1505634"/>
+            <a:ext cx="992658" cy="721266"/>
           </a:xfrm>
           <a:prstGeom prst="straightConnector1">
             <a:avLst/>
@@ -4410,14 +4413,15 @@
         <p:nvCxnSpPr>
           <p:cNvPr id="106" name="직선 화살표 연결선 105"/>
           <p:cNvCxnSpPr>
+            <a:stCxn id="156" idx="6"/>
             <a:endCxn id="92" idx="2"/>
           </p:cNvCxnSpPr>
           <p:nvPr/>
         </p:nvCxnSpPr>
         <p:spPr>
           <a:xfrm flipV="1">
-            <a:off x="3954947" y="1505634"/>
-            <a:ext cx="1066534" cy="2687478"/>
+            <a:off x="4026573" y="1505634"/>
+            <a:ext cx="994908" cy="2737641"/>
           </a:xfrm>
           <a:prstGeom prst="straightConnector1">
             <a:avLst/>
@@ -4499,7 +4503,7 @@
         <p:spPr>
           <a:xfrm>
             <a:off x="1787229" y="3029356"/>
-            <a:ext cx="871412" cy="0"/>
+            <a:ext cx="434534" cy="0"/>
           </a:xfrm>
           <a:prstGeom prst="straightConnector1">
             <a:avLst/>
@@ -4527,14 +4531,15 @@
         <p:nvCxnSpPr>
           <p:cNvPr id="117" name="직선 화살표 연결선 116"/>
           <p:cNvCxnSpPr>
+            <a:stCxn id="160" idx="6"/>
             <a:endCxn id="92" idx="2"/>
           </p:cNvCxnSpPr>
           <p:nvPr/>
         </p:nvCxnSpPr>
         <p:spPr>
           <a:xfrm flipV="1">
-            <a:off x="3944088" y="1505634"/>
-            <a:ext cx="1077393" cy="1512207"/>
+            <a:off x="4025514" y="1505634"/>
+            <a:ext cx="995967" cy="1455314"/>
           </a:xfrm>
           <a:prstGeom prst="straightConnector1">
             <a:avLst/>
@@ -5226,8 +5231,8 @@
         </p:nvSpPr>
         <p:spPr>
           <a:xfrm>
-            <a:off x="7436457" y="764704"/>
-            <a:ext cx="436338" cy="230832"/>
+            <a:off x="7436457" y="987090"/>
+            <a:ext cx="417102" cy="230832"/>
           </a:xfrm>
           <a:prstGeom prst="rect">
             <a:avLst/>
@@ -5241,12 +5246,12 @@
           <a:lstStyle/>
           <a:p>
             <a:r>
-              <a:rPr lang="en-US" altLang="ko-KR" sz="900" dirty="0" smtClean="0"/>
+              <a:rPr lang="en-US" altLang="ko-KR" sz="900" dirty="0" err="1" smtClean="0"/>
               <a:t>cost</a:t>
             </a:r>
             <a:r>
-              <a:rPr lang="en-US" altLang="ko-KR" sz="900" baseline="-25000" dirty="0" smtClean="0"/>
-              <a:t>k</a:t>
+              <a:rPr lang="en-US" altLang="ko-KR" sz="900" baseline="-25000" dirty="0" err="1" smtClean="0"/>
+              <a:t>l</a:t>
             </a:r>
             <a:endParaRPr lang="ko-KR" altLang="en-US" sz="900" baseline="-25000" dirty="0"/>
           </a:p>
@@ -5536,7 +5541,7 @@
         </p:nvSpPr>
         <p:spPr>
           <a:xfrm>
-            <a:off x="8278469" y="770111"/>
+            <a:off x="8278469" y="992497"/>
             <a:ext cx="397866" cy="230832"/>
           </a:xfrm>
           <a:prstGeom prst="rect">
@@ -5918,7 +5923,7 @@
         <p:spPr>
           <a:xfrm>
             <a:off x="6036216" y="3128023"/>
-            <a:ext cx="292068" cy="230832"/>
+            <a:ext cx="272832" cy="230832"/>
           </a:xfrm>
           <a:prstGeom prst="rect">
             <a:avLst/>
@@ -5932,12 +5937,12 @@
           <a:lstStyle/>
           <a:p>
             <a:r>
-              <a:rPr lang="en-US" altLang="ko-KR" sz="900" dirty="0" smtClean="0"/>
+              <a:rPr lang="en-US" altLang="ko-KR" sz="900" dirty="0" err="1" smtClean="0"/>
               <a:t>p</a:t>
             </a:r>
             <a:r>
-              <a:rPr lang="en-US" altLang="ko-KR" sz="900" baseline="-25000" dirty="0" smtClean="0"/>
-              <a:t>k</a:t>
+              <a:rPr lang="en-US" altLang="ko-KR" sz="900" baseline="-25000" dirty="0" err="1" smtClean="0"/>
+              <a:t>l</a:t>
             </a:r>
             <a:endParaRPr lang="ko-KR" altLang="en-US" sz="900" baseline="-25000" dirty="0"/>
           </a:p>
@@ -5998,7 +6003,7 @@
         <p:spPr>
           <a:xfrm>
             <a:off x="6756296" y="3120852"/>
-            <a:ext cx="279244" cy="230832"/>
+            <a:ext cx="260008" cy="230832"/>
           </a:xfrm>
           <a:prstGeom prst="rect">
             <a:avLst/>
@@ -6012,12 +6017,12 @@
           <a:lstStyle/>
           <a:p>
             <a:r>
-              <a:rPr lang="en-US" altLang="ko-KR" sz="900" dirty="0" smtClean="0"/>
+              <a:rPr lang="en-US" altLang="ko-KR" sz="900" dirty="0" err="1" smtClean="0"/>
               <a:t>y</a:t>
             </a:r>
             <a:r>
-              <a:rPr lang="en-US" altLang="ko-KR" sz="900" baseline="-25000" dirty="0" smtClean="0"/>
-              <a:t>k</a:t>
+              <a:rPr lang="en-US" altLang="ko-KR" sz="900" baseline="-25000" dirty="0" err="1" smtClean="0"/>
+              <a:t>l</a:t>
             </a:r>
             <a:endParaRPr lang="ko-KR" altLang="en-US" sz="900" baseline="-25000" dirty="0"/>
           </a:p>
@@ -6114,7 +6119,7 @@
         <p:spPr>
           <a:xfrm>
             <a:off x="7404368" y="3131676"/>
-            <a:ext cx="436338" cy="230832"/>
+            <a:ext cx="417102" cy="230832"/>
           </a:xfrm>
           <a:prstGeom prst="rect">
             <a:avLst/>
@@ -6128,12 +6133,12 @@
           <a:lstStyle/>
           <a:p>
             <a:r>
-              <a:rPr lang="en-US" altLang="ko-KR" sz="900" dirty="0" smtClean="0"/>
+              <a:rPr lang="en-US" altLang="ko-KR" sz="900" dirty="0" err="1" smtClean="0"/>
               <a:t>cost</a:t>
             </a:r>
             <a:r>
-              <a:rPr lang="en-US" altLang="ko-KR" sz="900" baseline="-25000" dirty="0" smtClean="0"/>
-              <a:t>k</a:t>
+              <a:rPr lang="en-US" altLang="ko-KR" sz="900" baseline="-25000" dirty="0" err="1" smtClean="0"/>
+              <a:t>l</a:t>
             </a:r>
             <a:endParaRPr lang="ko-KR" altLang="en-US" sz="900" baseline="-25000" dirty="0"/>
           </a:p>
@@ -6185,7 +6190,7 @@
             </p:nvSpPr>
             <p:spPr>
               <a:xfrm>
-                <a:off x="1446717" y="791496"/>
+                <a:off x="1446717" y="1013882"/>
                 <a:ext cx="330988" cy="254878"/>
               </a:xfrm>
               <a:prstGeom prst="rect">
@@ -6261,7 +6266,7 @@
             </p:nvSpPr>
             <p:spPr>
               <a:xfrm>
-                <a:off x="1446717" y="791496"/>
+                <a:off x="1446717" y="1013882"/>
                 <a:ext cx="330988" cy="254878"/>
               </a:xfrm>
               <a:prstGeom prst="rect">
@@ -6289,8 +6294,8 @@
           </p:sp>
         </mc:Fallback>
       </mc:AlternateContent>
-      <mc:AlternateContent xmlns:mc="http://schemas.openxmlformats.org/markup-compatibility/2006">
-        <mc:Choice xmlns:a14="http://schemas.microsoft.com/office/drawing/2010/main" Requires="a14">
+      <mc:AlternateContent xmlns:mc="http://schemas.openxmlformats.org/markup-compatibility/2006" xmlns:a14="http://schemas.microsoft.com/office/drawing/2010/main">
+        <mc:Choice Requires="a14">
           <p:sp>
             <p:nvSpPr>
               <p:cNvPr id="190" name="TextBox 189"/>
@@ -6364,7 +6369,7 @@
             </p:txBody>
           </p:sp>
         </mc:Choice>
-        <mc:Fallback>
+        <mc:Fallback xmlns="">
           <p:sp>
             <p:nvSpPr>
               <p:cNvPr id="190" name="TextBox 189"/>
@@ -6403,8 +6408,8 @@
           </p:sp>
         </mc:Fallback>
       </mc:AlternateContent>
-      <mc:AlternateContent xmlns:mc="http://schemas.openxmlformats.org/markup-compatibility/2006">
-        <mc:Choice xmlns:a14="http://schemas.microsoft.com/office/drawing/2010/main" Requires="a14">
+      <mc:AlternateContent xmlns:mc="http://schemas.openxmlformats.org/markup-compatibility/2006" xmlns:a14="http://schemas.microsoft.com/office/drawing/2010/main">
+        <mc:Choice Requires="a14">
           <p:sp>
             <p:nvSpPr>
               <p:cNvPr id="191" name="TextBox 190"/>
@@ -6478,7 +6483,7 @@
             </p:txBody>
           </p:sp>
         </mc:Choice>
-        <mc:Fallback>
+        <mc:Fallback xmlns="">
           <p:sp>
             <p:nvSpPr>
               <p:cNvPr id="191" name="TextBox 190"/>
@@ -6517,8 +6522,8 @@
           </p:sp>
         </mc:Fallback>
       </mc:AlternateContent>
-      <mc:AlternateContent xmlns:mc="http://schemas.openxmlformats.org/markup-compatibility/2006">
-        <mc:Choice xmlns:a14="http://schemas.microsoft.com/office/drawing/2010/main" Requires="a14">
+      <mc:AlternateContent xmlns:mc="http://schemas.openxmlformats.org/markup-compatibility/2006" xmlns:a14="http://schemas.microsoft.com/office/drawing/2010/main">
+        <mc:Choice Requires="a14">
           <p:sp>
             <p:nvSpPr>
               <p:cNvPr id="192" name="TextBox 191"/>
@@ -6592,7 +6597,7 @@
             </p:txBody>
           </p:sp>
         </mc:Choice>
-        <mc:Fallback>
+        <mc:Fallback xmlns="">
           <p:sp>
             <p:nvSpPr>
               <p:cNvPr id="192" name="TextBox 191"/>
@@ -6639,7 +6644,7 @@
         </p:nvSpPr>
         <p:spPr>
           <a:xfrm>
-            <a:off x="2661950" y="1412776"/>
+            <a:off x="2225072" y="1412776"/>
             <a:ext cx="216024" cy="216024"/>
           </a:xfrm>
           <a:prstGeom prst="ellipse">
@@ -6685,7 +6690,7 @@
         </p:nvSpPr>
         <p:spPr>
           <a:xfrm>
-            <a:off x="2661950" y="2132856"/>
+            <a:off x="2225072" y="2132856"/>
             <a:ext cx="216024" cy="216024"/>
           </a:xfrm>
           <a:prstGeom prst="ellipse">
@@ -6731,7 +6736,7 @@
         </p:nvSpPr>
         <p:spPr>
           <a:xfrm>
-            <a:off x="2659700" y="4170093"/>
+            <a:off x="2222822" y="4170093"/>
             <a:ext cx="216024" cy="216024"/>
           </a:xfrm>
           <a:prstGeom prst="ellipse">
@@ -6779,7 +6784,7 @@
             </p:nvSpPr>
             <p:spPr>
               <a:xfrm>
-                <a:off x="2565573" y="2416242"/>
+                <a:off x="2128695" y="2416242"/>
                 <a:ext cx="328936" cy="233269"/>
               </a:xfrm>
               <a:prstGeom prst="rect">
@@ -6855,7 +6860,7 @@
             </p:nvSpPr>
             <p:spPr>
               <a:xfrm>
-                <a:off x="2565573" y="2416242"/>
+                <a:off x="2128695" y="2416242"/>
                 <a:ext cx="328936" cy="233269"/>
               </a:xfrm>
               <a:prstGeom prst="rect">
@@ -6891,7 +6896,7 @@
         </p:nvSpPr>
         <p:spPr>
           <a:xfrm>
-            <a:off x="2629940" y="3497796"/>
+            <a:off x="2193062" y="3497796"/>
             <a:ext cx="221536" cy="461665"/>
           </a:xfrm>
           <a:prstGeom prst="rect">
@@ -6930,7 +6935,7 @@
         </p:nvSpPr>
         <p:spPr>
           <a:xfrm>
-            <a:off x="2658641" y="2921344"/>
+            <a:off x="2221763" y="2921344"/>
             <a:ext cx="216024" cy="216024"/>
           </a:xfrm>
           <a:prstGeom prst="ellipse">
@@ -6978,7 +6983,7 @@
             </p:nvSpPr>
             <p:spPr>
               <a:xfrm>
-                <a:off x="2534153" y="791496"/>
+                <a:off x="2097275" y="1013882"/>
                 <a:ext cx="328936" cy="254878"/>
               </a:xfrm>
               <a:prstGeom prst="rect">
@@ -7054,7 +7059,7 @@
             </p:nvSpPr>
             <p:spPr>
               <a:xfrm>
-                <a:off x="2534153" y="791496"/>
+                <a:off x="2097275" y="1013882"/>
                 <a:ext cx="328936" cy="254878"/>
               </a:xfrm>
               <a:prstGeom prst="rect">
@@ -7092,7 +7097,7 @@
             </p:nvSpPr>
             <p:spPr>
               <a:xfrm>
-                <a:off x="2534152" y="1678375"/>
+                <a:off x="2097274" y="1678375"/>
                 <a:ext cx="328936" cy="234423"/>
               </a:xfrm>
               <a:prstGeom prst="rect">
@@ -7168,7 +7173,7 @@
             </p:nvSpPr>
             <p:spPr>
               <a:xfrm>
-                <a:off x="2534152" y="1678375"/>
+                <a:off x="2097274" y="1678375"/>
                 <a:ext cx="328936" cy="234423"/>
               </a:xfrm>
               <a:prstGeom prst="rect">
@@ -7206,7 +7211,7 @@
             </p:nvSpPr>
             <p:spPr>
               <a:xfrm>
-                <a:off x="2525841" y="3173694"/>
+                <a:off x="2088963" y="3173694"/>
                 <a:ext cx="328936" cy="254878"/>
               </a:xfrm>
               <a:prstGeom prst="rect">
@@ -7282,7 +7287,7 @@
             </p:nvSpPr>
             <p:spPr>
               <a:xfrm>
-                <a:off x="2525841" y="3173694"/>
+                <a:off x="2088963" y="3173694"/>
                 <a:ext cx="328936" cy="254878"/>
               </a:xfrm>
               <a:prstGeom prst="rect">
@@ -7320,7 +7325,7 @@
             </p:nvSpPr>
             <p:spPr>
               <a:xfrm>
-                <a:off x="2559385" y="4499828"/>
+                <a:off x="2122507" y="4499828"/>
                 <a:ext cx="377026" cy="234423"/>
               </a:xfrm>
               <a:prstGeom prst="rect">
@@ -7396,7 +7401,7 @@
             </p:nvSpPr>
             <p:spPr>
               <a:xfrm>
-                <a:off x="2559385" y="4499828"/>
+                <a:off x="2122507" y="4499828"/>
                 <a:ext cx="377026" cy="234423"/>
               </a:xfrm>
               <a:prstGeom prst="rect">
@@ -7424,8 +7429,8 @@
           </p:sp>
         </mc:Fallback>
       </mc:AlternateContent>
-      <mc:AlternateContent xmlns:mc="http://schemas.openxmlformats.org/markup-compatibility/2006">
-        <mc:Choice xmlns:a14="http://schemas.microsoft.com/office/drawing/2010/main" Requires="a14">
+      <mc:AlternateContent xmlns:mc="http://schemas.openxmlformats.org/markup-compatibility/2006" xmlns:a14="http://schemas.microsoft.com/office/drawing/2010/main">
+        <mc:Choice Requires="a14">
           <p:sp>
             <p:nvSpPr>
               <p:cNvPr id="204" name="TextBox 203"/>
@@ -7499,7 +7504,7 @@
             </p:txBody>
           </p:sp>
         </mc:Choice>
-        <mc:Fallback>
+        <mc:Fallback xmlns="">
           <p:sp>
             <p:nvSpPr>
               <p:cNvPr id="204" name="TextBox 203"/>
@@ -7538,8 +7543,8 @@
           </p:sp>
         </mc:Fallback>
       </mc:AlternateContent>
-      <mc:AlternateContent xmlns:mc="http://schemas.openxmlformats.org/markup-compatibility/2006">
-        <mc:Choice xmlns:a14="http://schemas.microsoft.com/office/drawing/2010/main" Requires="a14">
+      <mc:AlternateContent xmlns:mc="http://schemas.openxmlformats.org/markup-compatibility/2006" xmlns:a14="http://schemas.microsoft.com/office/drawing/2010/main">
+        <mc:Choice Requires="a14">
           <p:sp>
             <p:nvSpPr>
               <p:cNvPr id="205" name="TextBox 204"/>
@@ -7619,7 +7624,7 @@
             </p:txBody>
           </p:sp>
         </mc:Choice>
-        <mc:Fallback>
+        <mc:Fallback xmlns="">
           <p:sp>
             <p:nvSpPr>
               <p:cNvPr id="205" name="TextBox 204"/>
@@ -7658,8 +7663,8 @@
           </p:sp>
         </mc:Fallback>
       </mc:AlternateContent>
-      <mc:AlternateContent xmlns:mc="http://schemas.openxmlformats.org/markup-compatibility/2006">
-        <mc:Choice xmlns:a14="http://schemas.microsoft.com/office/drawing/2010/main" Requires="a14">
+      <mc:AlternateContent xmlns:mc="http://schemas.openxmlformats.org/markup-compatibility/2006" xmlns:a14="http://schemas.microsoft.com/office/drawing/2010/main">
+        <mc:Choice Requires="a14">
           <p:sp>
             <p:nvSpPr>
               <p:cNvPr id="206" name="TextBox 205"/>
@@ -7733,7 +7738,7 @@
             </p:txBody>
           </p:sp>
         </mc:Choice>
-        <mc:Fallback>
+        <mc:Fallback xmlns="">
           <p:sp>
             <p:nvSpPr>
               <p:cNvPr id="206" name="TextBox 205"/>
@@ -7772,8 +7777,8 @@
           </p:sp>
         </mc:Fallback>
       </mc:AlternateContent>
-      <mc:AlternateContent xmlns:mc="http://schemas.openxmlformats.org/markup-compatibility/2006">
-        <mc:Choice xmlns:a14="http://schemas.microsoft.com/office/drawing/2010/main" Requires="a14">
+      <mc:AlternateContent xmlns:mc="http://schemas.openxmlformats.org/markup-compatibility/2006" xmlns:a14="http://schemas.microsoft.com/office/drawing/2010/main">
+        <mc:Choice Requires="a14">
           <p:sp>
             <p:nvSpPr>
               <p:cNvPr id="207" name="TextBox 206"/>
@@ -7847,7 +7852,7 @@
             </p:txBody>
           </p:sp>
         </mc:Choice>
-        <mc:Fallback>
+        <mc:Fallback xmlns="">
           <p:sp>
             <p:nvSpPr>
               <p:cNvPr id="207" name="TextBox 206"/>
@@ -7886,8 +7891,8 @@
           </p:sp>
         </mc:Fallback>
       </mc:AlternateContent>
-      <mc:AlternateContent xmlns:mc="http://schemas.openxmlformats.org/markup-compatibility/2006">
-        <mc:Choice xmlns:a14="http://schemas.microsoft.com/office/drawing/2010/main" Requires="a14">
+      <mc:AlternateContent xmlns:mc="http://schemas.openxmlformats.org/markup-compatibility/2006" xmlns:a14="http://schemas.microsoft.com/office/drawing/2010/main">
+        <mc:Choice Requires="a14">
           <p:sp>
             <p:nvSpPr>
               <p:cNvPr id="208" name="TextBox 207"/>
@@ -7961,7 +7966,7 @@
             </p:txBody>
           </p:sp>
         </mc:Choice>
-        <mc:Fallback>
+        <mc:Fallback xmlns="">
           <p:sp>
             <p:nvSpPr>
               <p:cNvPr id="208" name="TextBox 207"/>
@@ -8010,7 +8015,7 @@
             </p:nvSpPr>
             <p:spPr>
               <a:xfrm>
-                <a:off x="1148648" y="781306"/>
+                <a:off x="1148648" y="1003692"/>
                 <a:ext cx="384208" cy="254878"/>
               </a:xfrm>
               <a:prstGeom prst="rect">
@@ -8086,7 +8091,7 @@
             </p:nvSpPr>
             <p:spPr>
               <a:xfrm>
-                <a:off x="1148648" y="781306"/>
+                <a:off x="1148648" y="1003692"/>
                 <a:ext cx="384208" cy="254878"/>
               </a:xfrm>
               <a:prstGeom prst="rect">
@@ -8125,7 +8130,7 @@
             <p:spPr>
               <a:xfrm>
                 <a:off x="4293096" y="3162770"/>
-                <a:ext cx="456663" cy="233269"/>
+                <a:ext cx="453457" cy="233590"/>
               </a:xfrm>
               <a:prstGeom prst="rect">
                 <a:avLst/>
@@ -8169,7 +8174,13 @@
                             <a:rPr lang="en-US" altLang="ko-KR" sz="900" b="0" i="1" smtClean="0">
                               <a:latin typeface="Cambria Math"/>
                             </a:rPr>
-                            <m:t>630</m:t>
+                            <m:t>99</m:t>
+                          </m:r>
+                          <m:r>
+                            <a:rPr lang="en-US" altLang="ko-KR" sz="900" b="0" i="1" smtClean="0">
+                              <a:latin typeface="Cambria Math"/>
+                            </a:rPr>
+                            <m:t>0</m:t>
                           </m:r>
                         </m:sub>
                         <m:sup>
@@ -8177,7 +8188,7 @@
                             <a:rPr lang="en-US" altLang="ko-KR" sz="900" b="0" i="1" smtClean="0">
                               <a:latin typeface="Cambria Math"/>
                             </a:rPr>
-                            <m:t>1</m:t>
+                            <m:t>2</m:t>
                           </m:r>
                         </m:sup>
                       </m:sSubSup>
@@ -8201,7 +8212,7 @@
             <p:spPr>
               <a:xfrm>
                 <a:off x="4293096" y="3162770"/>
-                <a:ext cx="456663" cy="233269"/>
+                <a:ext cx="453457" cy="233590"/>
               </a:xfrm>
               <a:prstGeom prst="rect">
                 <a:avLst/>
@@ -8239,7 +8250,7 @@
             <p:spPr>
               <a:xfrm>
                 <a:off x="4277117" y="2622903"/>
-                <a:ext cx="390299" cy="253724"/>
+                <a:ext cx="390300" cy="254044"/>
               </a:xfrm>
               <a:prstGeom prst="rect">
                 <a:avLst/>
@@ -8297,7 +8308,7 @@
                             <a:rPr lang="en-US" altLang="ko-KR" sz="900" b="0" i="1" smtClean="0">
                               <a:latin typeface="Cambria Math"/>
                             </a:rPr>
-                            <m:t>1</m:t>
+                            <m:t>2</m:t>
                           </m:r>
                         </m:sup>
                       </m:sSubSup>
@@ -8321,7 +8332,7 @@
             <p:spPr>
               <a:xfrm>
                 <a:off x="4277117" y="2622903"/>
-                <a:ext cx="390299" cy="253724"/>
+                <a:ext cx="390300" cy="254044"/>
               </a:xfrm>
               <a:prstGeom prst="rect">
                 <a:avLst/>
@@ -8359,7 +8370,7 @@
             <p:spPr>
               <a:xfrm>
                 <a:off x="4295321" y="1971304"/>
-                <a:ext cx="405880" cy="233269"/>
+                <a:ext cx="405880" cy="233590"/>
               </a:xfrm>
               <a:prstGeom prst="rect">
                 <a:avLst/>
@@ -8411,7 +8422,7 @@
                             <a:rPr lang="en-US" altLang="ko-KR" sz="900" b="0" i="1" smtClean="0">
                               <a:latin typeface="Cambria Math"/>
                             </a:rPr>
-                            <m:t>1</m:t>
+                            <m:t>2</m:t>
                           </m:r>
                         </m:sup>
                       </m:sSubSup>
@@ -8435,7 +8446,7 @@
             <p:spPr>
               <a:xfrm>
                 <a:off x="4295321" y="1971304"/>
-                <a:ext cx="405880" cy="233269"/>
+                <a:ext cx="405880" cy="233590"/>
               </a:xfrm>
               <a:prstGeom prst="rect">
                 <a:avLst/>
@@ -8473,7 +8484,7 @@
             <p:spPr>
               <a:xfrm>
                 <a:off x="4243933" y="1543753"/>
-                <a:ext cx="408573" cy="233269"/>
+                <a:ext cx="423193" cy="233590"/>
               </a:xfrm>
               <a:prstGeom prst="rect">
                 <a:avLst/>
@@ -8525,7 +8536,7 @@
                             <a:rPr lang="en-US" altLang="ko-KR" sz="900" b="0" i="1" smtClean="0">
                               <a:latin typeface="Cambria Math"/>
                             </a:rPr>
-                            <m:t>1</m:t>
+                            <m:t>2</m:t>
                           </m:r>
                         </m:sup>
                       </m:sSubSup>
@@ -8549,7 +8560,7 @@
             <p:spPr>
               <a:xfrm>
                 <a:off x="4243933" y="1543753"/>
-                <a:ext cx="408573" cy="233269"/>
+                <a:ext cx="423193" cy="233590"/>
               </a:xfrm>
               <a:prstGeom prst="rect">
                 <a:avLst/>
@@ -8586,8 +8597,8 @@
             </p:nvSpPr>
             <p:spPr>
               <a:xfrm>
-                <a:off x="4267763" y="751316"/>
-                <a:ext cx="395942" cy="253724"/>
+                <a:off x="4267763" y="973702"/>
+                <a:ext cx="397032" cy="236347"/>
               </a:xfrm>
               <a:prstGeom prst="rect">
                 <a:avLst/>
@@ -8631,7 +8642,7 @@
                             <a:rPr lang="en-US" altLang="ko-KR" sz="900" b="0" i="1" smtClean="0">
                               <a:latin typeface="Cambria Math"/>
                             </a:rPr>
-                            <m:t>𝑗𝑘</m:t>
+                            <m:t>𝑘𝑙</m:t>
                           </m:r>
                         </m:sub>
                         <m:sup>
@@ -8639,7 +8650,7 @@
                             <a:rPr lang="en-US" altLang="ko-KR" sz="900" b="0" i="1" smtClean="0">
                               <a:latin typeface="Cambria Math"/>
                             </a:rPr>
-                            <m:t>1</m:t>
+                            <m:t>2</m:t>
                           </m:r>
                         </m:sup>
                       </m:sSubSup>
@@ -8662,8 +8673,8 @@
             </p:nvSpPr>
             <p:spPr>
               <a:xfrm>
-                <a:off x="4267763" y="751316"/>
-                <a:ext cx="395942" cy="253724"/>
+                <a:off x="4267763" y="973702"/>
+                <a:ext cx="397032" cy="236347"/>
               </a:xfrm>
               <a:prstGeom prst="rect">
                 <a:avLst/>
@@ -8701,7 +8712,7 @@
             <p:spPr>
               <a:xfrm>
                 <a:off x="4946572" y="2389450"/>
-                <a:ext cx="328551" cy="232179"/>
+                <a:ext cx="330988" cy="232500"/>
               </a:xfrm>
               <a:prstGeom prst="rect">
                 <a:avLst/>
@@ -8753,7 +8764,7 @@
                             <a:rPr lang="en-US" altLang="ko-KR" sz="900" b="0" i="1" smtClean="0">
                               <a:latin typeface="Cambria Math"/>
                             </a:rPr>
-                            <m:t>1</m:t>
+                            <m:t>2</m:t>
                           </m:r>
                         </m:sup>
                       </m:sSubSup>
@@ -8777,7 +8788,7 @@
             <p:spPr>
               <a:xfrm>
                 <a:off x="4946572" y="2389450"/>
-                <a:ext cx="328551" cy="232179"/>
+                <a:ext cx="330988" cy="232500"/>
               </a:xfrm>
               <a:prstGeom prst="rect">
                 <a:avLst/>
@@ -8814,8 +8825,8 @@
             </p:nvSpPr>
             <p:spPr>
               <a:xfrm>
-                <a:off x="4915152" y="764704"/>
-                <a:ext cx="332975" cy="236027"/>
+                <a:off x="4915152" y="987090"/>
+                <a:ext cx="330988" cy="236347"/>
               </a:xfrm>
               <a:prstGeom prst="rect">
                 <a:avLst/>
@@ -8859,7 +8870,7 @@
                             <a:rPr lang="en-US" altLang="ko-KR" sz="900" b="0" i="1" smtClean="0">
                               <a:latin typeface="Cambria Math"/>
                             </a:rPr>
-                            <m:t>𝑘</m:t>
+                            <m:t>𝑙</m:t>
                           </m:r>
                         </m:sub>
                         <m:sup>
@@ -8867,7 +8878,7 @@
                             <a:rPr lang="en-US" altLang="ko-KR" sz="900" b="0" i="1" smtClean="0">
                               <a:latin typeface="Cambria Math"/>
                             </a:rPr>
-                            <m:t>1</m:t>
+                            <m:t>2</m:t>
                           </m:r>
                         </m:sup>
                       </m:sSubSup>
@@ -8890,8 +8901,8 @@
             </p:nvSpPr>
             <p:spPr>
               <a:xfrm>
-                <a:off x="4915152" y="764704"/>
-                <a:ext cx="332975" cy="236027"/>
+                <a:off x="4915152" y="987090"/>
+                <a:ext cx="330988" cy="236347"/>
               </a:xfrm>
               <a:prstGeom prst="rect">
                 <a:avLst/>
@@ -8929,7 +8940,7 @@
             <p:spPr>
               <a:xfrm>
                 <a:off x="4915151" y="1651583"/>
-                <a:ext cx="328551" cy="233269"/>
+                <a:ext cx="330988" cy="233590"/>
               </a:xfrm>
               <a:prstGeom prst="rect">
                 <a:avLst/>
@@ -8981,7 +8992,7 @@
                             <a:rPr lang="en-US" altLang="ko-KR" sz="900" b="0" i="1" smtClean="0">
                               <a:latin typeface="Cambria Math"/>
                             </a:rPr>
-                            <m:t>1</m:t>
+                            <m:t>2</m:t>
                           </m:r>
                         </m:sup>
                       </m:sSubSup>
@@ -9005,7 +9016,7 @@
             <p:spPr>
               <a:xfrm>
                 <a:off x="4915151" y="1651583"/>
-                <a:ext cx="328551" cy="233269"/>
+                <a:ext cx="330988" cy="233590"/>
               </a:xfrm>
               <a:prstGeom prst="rect">
                 <a:avLst/>
@@ -9043,7 +9054,7 @@
             <p:spPr>
               <a:xfrm>
                 <a:off x="4906840" y="3146902"/>
-                <a:ext cx="332975" cy="236027"/>
+                <a:ext cx="330988" cy="236347"/>
               </a:xfrm>
               <a:prstGeom prst="rect">
                 <a:avLst/>
@@ -9087,7 +9098,7 @@
                             <a:rPr lang="en-US" altLang="ko-KR" sz="900" b="0" i="1" smtClean="0">
                               <a:latin typeface="Cambria Math"/>
                             </a:rPr>
-                            <m:t>𝑘</m:t>
+                            <m:t>𝑙</m:t>
                           </m:r>
                         </m:sub>
                         <m:sup>
@@ -9095,7 +9106,7 @@
                             <a:rPr lang="en-US" altLang="ko-KR" sz="900" b="0" i="1" smtClean="0">
                               <a:latin typeface="Cambria Math"/>
                             </a:rPr>
-                            <m:t>1</m:t>
+                            <m:t>2</m:t>
                           </m:r>
                         </m:sup>
                       </m:sSubSup>
@@ -9119,13 +9130,13 @@
             <p:spPr>
               <a:xfrm>
                 <a:off x="4906840" y="3146902"/>
-                <a:ext cx="332975" cy="236027"/>
+                <a:ext cx="330988" cy="236347"/>
               </a:xfrm>
               <a:prstGeom prst="rect">
                 <a:avLst/>
               </a:prstGeom>
               <a:blipFill rotWithShape="1">
-                <a:blip r:embed="rId24"/>
+                <a:blip r:embed="rId26"/>
                 <a:stretch>
                   <a:fillRect/>
                 </a:stretch>
@@ -9209,7 +9220,7 @@
                             <a:rPr lang="en-US" altLang="ko-KR" sz="900" b="0" i="1" smtClean="0">
                               <a:latin typeface="Cambria Math"/>
                             </a:rPr>
-                            <m:t>1</m:t>
+                            <m:t>2</m:t>
                           </m:r>
                         </m:sup>
                       </m:sSubSup>
@@ -9239,7 +9250,7 @@
                 <a:avLst/>
               </a:prstGeom>
               <a:blipFill rotWithShape="1">
-                <a:blip r:embed="rId26"/>
+                <a:blip r:embed="rId27"/>
                 <a:stretch>
                   <a:fillRect/>
                 </a:stretch>
@@ -9260,8 +9271,8 @@
           </p:sp>
         </mc:Fallback>
       </mc:AlternateContent>
-      <mc:AlternateContent xmlns:mc="http://schemas.openxmlformats.org/markup-compatibility/2006">
-        <mc:Choice xmlns:a14="http://schemas.microsoft.com/office/drawing/2010/main" Requires="a14">
+      <mc:AlternateContent xmlns:mc="http://schemas.openxmlformats.org/markup-compatibility/2006" xmlns:a14="http://schemas.microsoft.com/office/drawing/2010/main">
+        <mc:Choice Requires="a14">
           <p:sp>
             <p:nvSpPr>
               <p:cNvPr id="221" name="직사각형 220"/>
@@ -9398,7 +9409,7 @@
             </p:txBody>
           </p:sp>
         </mc:Choice>
-        <mc:Fallback>
+        <mc:Fallback xmlns="">
           <p:sp>
             <p:nvSpPr>
               <p:cNvPr id="221" name="직사각형 220"/>
@@ -9416,7 +9427,7 @@
                 <a:avLst/>
               </a:prstGeom>
               <a:blipFill rotWithShape="1">
-                <a:blip r:embed="rId27"/>
+                <a:blip r:embed="rId28"/>
                 <a:stretch>
                   <a:fillRect/>
                 </a:stretch>
@@ -9437,8 +9448,8 @@
           </p:sp>
         </mc:Fallback>
       </mc:AlternateContent>
-      <mc:AlternateContent xmlns:mc="http://schemas.openxmlformats.org/markup-compatibility/2006">
-        <mc:Choice xmlns:a14="http://schemas.microsoft.com/office/drawing/2010/main" Requires="a14">
+      <mc:AlternateContent xmlns:mc="http://schemas.openxmlformats.org/markup-compatibility/2006" xmlns:a14="http://schemas.microsoft.com/office/drawing/2010/main">
+        <mc:Choice Requires="a14">
           <p:sp>
             <p:nvSpPr>
               <p:cNvPr id="222" name="직사각형 221"/>
@@ -9623,7 +9634,7 @@
             </p:txBody>
           </p:sp>
         </mc:Choice>
-        <mc:Fallback>
+        <mc:Fallback xmlns="">
           <p:sp>
             <p:nvSpPr>
               <p:cNvPr id="222" name="직사각형 221"/>
@@ -9641,7 +9652,7 @@
                 <a:avLst/>
               </a:prstGeom>
               <a:blipFill rotWithShape="1">
-                <a:blip r:embed="rId28"/>
+                <a:blip r:embed="rId29"/>
                 <a:stretch>
                   <a:fillRect t="-88608" b="-140506"/>
                 </a:stretch>
@@ -9662,8 +9673,8 @@
           </p:sp>
         </mc:Fallback>
       </mc:AlternateContent>
-      <mc:AlternateContent xmlns:mc="http://schemas.openxmlformats.org/markup-compatibility/2006">
-        <mc:Choice xmlns:a14="http://schemas.microsoft.com/office/drawing/2010/main" Requires="a14">
+      <mc:AlternateContent xmlns:mc="http://schemas.openxmlformats.org/markup-compatibility/2006" xmlns:a14="http://schemas.microsoft.com/office/drawing/2010/main">
+        <mc:Choice Requires="a14">
           <p:sp>
             <p:nvSpPr>
               <p:cNvPr id="223" name="TextBox 222"/>
@@ -9779,7 +9790,7 @@
             </p:txBody>
           </p:sp>
         </mc:Choice>
-        <mc:Fallback>
+        <mc:Fallback xmlns="">
           <p:sp>
             <p:nvSpPr>
               <p:cNvPr id="223" name="TextBox 222"/>
@@ -9797,7 +9808,7 @@
                 <a:avLst/>
               </a:prstGeom>
               <a:blipFill rotWithShape="1">
-                <a:blip r:embed="rId29"/>
+                <a:blip r:embed="rId30"/>
                 <a:stretch>
                   <a:fillRect/>
                 </a:stretch>
@@ -9818,8 +9829,8 @@
           </p:sp>
         </mc:Fallback>
       </mc:AlternateContent>
-      <mc:AlternateContent xmlns:mc="http://schemas.openxmlformats.org/markup-compatibility/2006">
-        <mc:Choice xmlns:a14="http://schemas.microsoft.com/office/drawing/2010/main" Requires="a14">
+      <mc:AlternateContent xmlns:mc="http://schemas.openxmlformats.org/markup-compatibility/2006" xmlns:a14="http://schemas.microsoft.com/office/drawing/2010/main">
+        <mc:Choice Requires="a14">
           <p:sp>
             <p:nvSpPr>
               <p:cNvPr id="224" name="TextBox 223"/>
@@ -9888,7 +9899,7 @@
             </p:txBody>
           </p:sp>
         </mc:Choice>
-        <mc:Fallback>
+        <mc:Fallback xmlns="">
           <p:sp>
             <p:nvSpPr>
               <p:cNvPr id="224" name="TextBox 223"/>
@@ -9906,7 +9917,7 @@
                 <a:avLst/>
               </a:prstGeom>
               <a:blipFill rotWithShape="1">
-                <a:blip r:embed="rId30"/>
+                <a:blip r:embed="rId31"/>
                 <a:stretch>
                   <a:fillRect/>
                 </a:stretch>
@@ -9937,8 +9948,8 @@
             </p:nvSpPr>
             <p:spPr>
               <a:xfrm>
-                <a:off x="3551165" y="5387789"/>
-                <a:ext cx="2304256" cy="497444"/>
+                <a:off x="4084759" y="4365104"/>
+                <a:ext cx="1254948" cy="497444"/>
               </a:xfrm>
               <a:prstGeom prst="rect">
                 <a:avLst/>
@@ -9975,7 +9986,7 @@
                             <a:rPr lang="en-US" altLang="ko-KR" sz="900" b="0" i="1" smtClean="0">
                               <a:latin typeface="Cambria Math"/>
                             </a:rPr>
-                            <m:t>𝑗</m:t>
+                            <m:t>𝑘</m:t>
                           </m:r>
                           <m:r>
                             <a:rPr lang="en-US" altLang="ko-KR" sz="900" i="1">
@@ -9989,7 +10000,7 @@
                             <a:rPr lang="en-US" altLang="ko-KR" sz="900" b="0" i="1" smtClean="0">
                               <a:latin typeface="Cambria Math"/>
                             </a:rPr>
-                            <m:t>64</m:t>
+                            <m:t>100</m:t>
                           </m:r>
                         </m:sup>
                         <m:e>
@@ -10017,7 +10028,7 @@
                                 <a:rPr lang="en-US" altLang="ko-KR" sz="900" b="0" i="1" smtClean="0">
                                   <a:latin typeface="Cambria Math"/>
                                 </a:rPr>
-                                <m:t>𝑗</m:t>
+                                <m:t>𝑘</m:t>
                               </m:r>
                             </m:sub>
                             <m:sup>
@@ -10025,7 +10036,7 @@
                                 <a:rPr lang="en-US" altLang="ko-KR" sz="900" b="0" i="1" smtClean="0">
                                   <a:latin typeface="Cambria Math"/>
                                 </a:rPr>
-                                <m:t>0</m:t>
+                                <m:t>1</m:t>
                               </m:r>
                             </m:sup>
                           </m:sSubSup>
@@ -10058,7 +10069,13 @@
                             <a:rPr lang="en-US" altLang="ko-KR" sz="900" b="0" i="1" smtClean="0">
                               <a:latin typeface="Cambria Math"/>
                             </a:rPr>
-                            <m:t>𝑗𝑘</m:t>
+                            <m:t>𝑘</m:t>
+                          </m:r>
+                          <m:r>
+                            <a:rPr lang="en-US" altLang="ko-KR" sz="900" b="0" i="1" smtClean="0">
+                              <a:latin typeface="Cambria Math"/>
+                            </a:rPr>
+                            <m:t>𝑙</m:t>
                           </m:r>
                         </m:sub>
                         <m:sup>
@@ -10066,7 +10083,7 @@
                             <a:rPr lang="en-US" altLang="ko-KR" sz="900" b="0" i="1" smtClean="0">
                               <a:latin typeface="Cambria Math"/>
                             </a:rPr>
-                            <m:t>1</m:t>
+                            <m:t>2</m:t>
                           </m:r>
                         </m:sup>
                       </m:sSubSup>
@@ -10097,10 +10114,10 @@
                         </m:e>
                         <m:sub>
                           <m:r>
-                            <a:rPr lang="en-US" altLang="ko-KR" sz="900" i="1">
-                              <a:latin typeface="Cambria Math"/>
-                            </a:rPr>
-                            <m:t>𝑘</m:t>
+                            <a:rPr lang="en-US" altLang="ko-KR" sz="900" b="0" i="1" smtClean="0">
+                              <a:latin typeface="Cambria Math"/>
+                            </a:rPr>
+                            <m:t>𝑙</m:t>
                           </m:r>
                         </m:sub>
                         <m:sup>
@@ -10108,7 +10125,7 @@
                             <a:rPr lang="en-US" altLang="ko-KR" sz="900" b="0" i="1" smtClean="0">
                               <a:latin typeface="Cambria Math"/>
                             </a:rPr>
-                            <m:t>1</m:t>
+                            <m:t>2</m:t>
                           </m:r>
                         </m:sup>
                       </m:sSubSup>
@@ -10131,16 +10148,16 @@
             </p:nvSpPr>
             <p:spPr>
               <a:xfrm>
-                <a:off x="3551165" y="5387789"/>
-                <a:ext cx="2304256" cy="497444"/>
+                <a:off x="4084759" y="4365104"/>
+                <a:ext cx="1254948" cy="497444"/>
               </a:xfrm>
               <a:prstGeom prst="rect">
                 <a:avLst/>
               </a:prstGeom>
               <a:blipFill rotWithShape="1">
-                <a:blip r:embed="rId31"/>
+                <a:blip r:embed="rId32"/>
                 <a:stretch>
-                  <a:fillRect t="-86420" b="-134568"/>
+                  <a:fillRect l="-19903" t="-85366" b="-131707"/>
                 </a:stretch>
               </a:blipFill>
             </p:spPr>
@@ -10170,7 +10187,7 @@
             <p:spPr>
               <a:xfrm>
                 <a:off x="4083351" y="3948995"/>
-                <a:ext cx="722762" cy="233269"/>
+                <a:ext cx="768159" cy="233590"/>
               </a:xfrm>
               <a:prstGeom prst="rect">
                 <a:avLst/>
@@ -10222,7 +10239,7 @@
                             <a:rPr lang="en-US" altLang="ko-KR" sz="900" b="0" i="1" smtClean="0">
                               <a:latin typeface="Cambria Math"/>
                             </a:rPr>
-                            <m:t>1</m:t>
+                            <m:t>2</m:t>
                           </m:r>
                         </m:sup>
                       </m:sSubSup>
@@ -10256,7 +10273,13 @@
                             <a:rPr lang="en-US" altLang="ko-KR" sz="900" b="0" i="1" smtClean="0">
                               <a:latin typeface="Cambria Math"/>
                             </a:rPr>
-                            <m:t>640</m:t>
+                            <m:t>100</m:t>
+                          </m:r>
+                          <m:r>
+                            <a:rPr lang="en-US" altLang="ko-KR" sz="900" b="0" i="1" smtClean="0">
+                              <a:latin typeface="Cambria Math"/>
+                            </a:rPr>
+                            <m:t>0</m:t>
                           </m:r>
                         </m:sub>
                         <m:sup>
@@ -10264,7 +10287,7 @@
                             <a:rPr lang="en-US" altLang="ko-KR" sz="900" b="0" i="1" smtClean="0">
                               <a:latin typeface="Cambria Math"/>
                             </a:rPr>
-                            <m:t>1</m:t>
+                            <m:t>2</m:t>
                           </m:r>
                         </m:sup>
                       </m:sSubSup>
@@ -10288,13 +10311,13 @@
             <p:spPr>
               <a:xfrm>
                 <a:off x="4083351" y="3948995"/>
-                <a:ext cx="722762" cy="233269"/>
+                <a:ext cx="768159" cy="233590"/>
               </a:xfrm>
               <a:prstGeom prst="rect">
                 <a:avLst/>
               </a:prstGeom>
               <a:blipFill rotWithShape="1">
-                <a:blip r:embed="rId32"/>
+                <a:blip r:embed="rId33"/>
                 <a:stretch>
                   <a:fillRect/>
                 </a:stretch>
@@ -10325,7 +10348,7 @@
             </p:nvSpPr>
             <p:spPr>
               <a:xfrm>
-                <a:off x="2344582" y="4872255"/>
+                <a:off x="1907704" y="4872255"/>
                 <a:ext cx="591829" cy="234423"/>
               </a:xfrm>
               <a:prstGeom prst="rect">
@@ -10413,14 +10436,14 @@
             </p:nvSpPr>
             <p:spPr>
               <a:xfrm>
-                <a:off x="2344582" y="4872255"/>
+                <a:off x="1907704" y="4872255"/>
                 <a:ext cx="591829" cy="234423"/>
               </a:xfrm>
               <a:prstGeom prst="rect">
                 <a:avLst/>
               </a:prstGeom>
               <a:blipFill rotWithShape="1">
-                <a:blip r:embed="rId33"/>
+                <a:blip r:embed="rId34"/>
                 <a:stretch>
                   <a:fillRect/>
                 </a:stretch>
@@ -10487,15 +10510,15 @@
             </p:nvSpPr>
             <p:spPr>
               <a:xfrm>
-                <a:off x="5235255" y="4616590"/>
-                <a:ext cx="833883" cy="405111"/>
+                <a:off x="5235254" y="4616590"/>
+                <a:ext cx="794339" cy="405752"/>
               </a:xfrm>
               <a:prstGeom prst="rect">
                 <a:avLst/>
               </a:prstGeom>
             </p:spPr>
             <p:txBody>
-              <a:bodyPr wrap="none">
+              <a:bodyPr wrap="square">
                 <a:spAutoFit/>
               </a:bodyPr>
               <a:lstStyle/>
@@ -10546,10 +10569,10 @@
                               </m:e>
                               <m:sub>
                                 <m:r>
-                                  <a:rPr lang="en-US" altLang="ko-KR" sz="900" i="1">
+                                  <a:rPr lang="en-US" altLang="ko-KR" sz="900" b="0" i="1" smtClean="0">
                                     <a:latin typeface="Cambria Math"/>
                                   </a:rPr>
-                                  <m:t>𝑘</m:t>
+                                  <m:t>𝑙</m:t>
                                 </m:r>
                               </m:sub>
                               <m:sup>
@@ -10557,7 +10580,7 @@
                                   <a:rPr lang="en-US" altLang="ko-KR" sz="900" b="0" i="1" smtClean="0">
                                     <a:latin typeface="Cambria Math"/>
                                   </a:rPr>
-                                  <m:t>1</m:t>
+                                  <m:t>2</m:t>
                                 </m:r>
                               </m:sup>
                             </m:sSubSup>
@@ -10577,10 +10600,13 @@
                           </m:naryPr>
                           <m:sub>
                             <m:r>
-                              <a:rPr lang="en-US" altLang="ko-KR" sz="900" i="1">
+                              <m:rPr>
+                                <m:brk/>
+                              </m:rPr>
+                              <a:rPr lang="en-US" altLang="ko-KR" sz="900" b="0" i="1" smtClean="0">
                                 <a:latin typeface="Cambria Math"/>
                               </a:rPr>
-                              <m:t>𝑘</m:t>
+                              <m:t>𝑙</m:t>
                             </m:r>
                             <m:r>
                               <a:rPr lang="en-US" altLang="ko-KR" sz="900" i="1">
@@ -10633,10 +10659,10 @@
                                   </m:e>
                                   <m:sub>
                                     <m:r>
-                                      <a:rPr lang="en-US" altLang="ko-KR" sz="900" i="1">
+                                      <a:rPr lang="en-US" altLang="ko-KR" sz="900" b="0" i="1" smtClean="0">
                                         <a:latin typeface="Cambria Math"/>
                                       </a:rPr>
-                                      <m:t>𝑘</m:t>
+                                      <m:t>𝑙</m:t>
                                     </m:r>
                                   </m:sub>
                                   <m:sup>
@@ -10644,7 +10670,7 @@
                                       <a:rPr lang="en-US" altLang="ko-KR" sz="900" b="0" i="1" smtClean="0">
                                         <a:latin typeface="Cambria Math"/>
                                       </a:rPr>
-                                      <m:t>1</m:t>
+                                      <m:t>2</m:t>
                                     </m:r>
                                   </m:sup>
                                 </m:sSubSup>
@@ -10689,10 +10715,10 @@
                       </m:e>
                       <m:sub>
                         <m:r>
-                          <a:rPr lang="en-US" altLang="ko-KR" sz="900" i="1">
+                          <a:rPr lang="en-US" altLang="ko-KR" sz="900" b="0" i="1" smtClean="0">
                             <a:latin typeface="Cambria Math"/>
                           </a:rPr>
-                          <m:t>𝑘</m:t>
+                          <m:t>𝑙</m:t>
                         </m:r>
                       </m:sub>
                     </m:sSub>
@@ -10714,16 +10740,16 @@
             </p:nvSpPr>
             <p:spPr>
               <a:xfrm>
-                <a:off x="5235255" y="4616590"/>
-                <a:ext cx="833883" cy="405111"/>
+                <a:off x="5235254" y="4616590"/>
+                <a:ext cx="794339" cy="405752"/>
               </a:xfrm>
               <a:prstGeom prst="rect">
                 <a:avLst/>
               </a:prstGeom>
               <a:blipFill rotWithShape="1">
-                <a:blip r:embed="rId34"/>
+                <a:blip r:embed="rId35"/>
                 <a:stretch>
-                  <a:fillRect l="-8759" b="-52239"/>
+                  <a:fillRect l="-9231" b="-52239"/>
                 </a:stretch>
               </a:blipFill>
             </p:spPr>
@@ -10753,7 +10779,7 @@
             <p:spPr>
               <a:xfrm>
                 <a:off x="6918251" y="4865595"/>
-                <a:ext cx="1139799" cy="871392"/>
+                <a:ext cx="1150315" cy="871392"/>
               </a:xfrm>
               <a:prstGeom prst="rect">
                 <a:avLst/>
@@ -10783,10 +10809,10 @@
                         </m:naryPr>
                         <m:sub>
                           <m:r>
-                            <a:rPr lang="en-US" altLang="ko-KR" sz="900" i="1">
-                              <a:latin typeface="Cambria Math"/>
-                            </a:rPr>
-                            <m:t>𝑘</m:t>
+                            <a:rPr lang="en-US" altLang="ko-KR" sz="900" b="0" i="1" smtClean="0">
+                              <a:latin typeface="Cambria Math"/>
+                            </a:rPr>
+                            <m:t>𝑙</m:t>
                           </m:r>
                           <m:r>
                             <a:rPr lang="en-US" altLang="ko-KR" sz="900" i="1">
@@ -10828,10 +10854,10 @@
                             </m:e>
                             <m:sub>
                               <m:r>
-                                <a:rPr lang="en-US" altLang="ko-KR" sz="900" i="1">
+                                <a:rPr lang="en-US" altLang="ko-KR" sz="900" b="0" i="1" smtClean="0">
                                   <a:latin typeface="Cambria Math"/>
                                 </a:rPr>
-                                <m:t>𝑘</m:t>
+                                <m:t>𝑙</m:t>
                               </m:r>
                             </m:sub>
                           </m:sSub>
@@ -10874,10 +10900,10 @@
                             </m:e>
                             <m:sub>
                               <m:r>
-                                <a:rPr lang="en-US" altLang="ko-KR" sz="900" i="1">
+                                <a:rPr lang="en-US" altLang="ko-KR" sz="900" b="0" i="1" smtClean="0">
                                   <a:latin typeface="Cambria Math"/>
                                 </a:rPr>
-                                <m:t>𝑘</m:t>
+                                <m:t>𝑙</m:t>
                               </m:r>
                             </m:sub>
                           </m:sSub>
@@ -10908,10 +10934,10 @@
                         </m:naryPr>
                         <m:sub>
                           <m:r>
-                            <a:rPr lang="en-US" altLang="ko-KR" sz="900" i="1">
-                              <a:latin typeface="Cambria Math"/>
-                            </a:rPr>
-                            <m:t>𝑘</m:t>
+                            <a:rPr lang="en-US" altLang="ko-KR" sz="900" b="0" i="1" smtClean="0">
+                              <a:latin typeface="Cambria Math"/>
+                            </a:rPr>
+                            <m:t>𝑙</m:t>
                           </m:r>
                           <m:r>
                             <a:rPr lang="en-US" altLang="ko-KR" sz="900" i="1">
@@ -10950,10 +10976,10 @@
                             </m:e>
                             <m:sub>
                               <m:r>
-                                <a:rPr lang="en-US" altLang="ko-KR" sz="900" i="1">
+                                <a:rPr lang="en-US" altLang="ko-KR" sz="900" b="0" i="1" smtClean="0">
                                   <a:latin typeface="Cambria Math"/>
                                 </a:rPr>
-                                <m:t>𝑘</m:t>
+                                <m:t>𝑙</m:t>
                               </m:r>
                             </m:sub>
                           </m:sSub>
@@ -10994,15 +11020,15 @@
             <p:spPr>
               <a:xfrm>
                 <a:off x="6918251" y="4865595"/>
-                <a:ext cx="1139799" cy="871392"/>
+                <a:ext cx="1150315" cy="871392"/>
               </a:xfrm>
               <a:prstGeom prst="rect">
                 <a:avLst/>
               </a:prstGeom>
               <a:blipFill rotWithShape="1">
-                <a:blip r:embed="rId35"/>
+                <a:blip r:embed="rId36"/>
                 <a:stretch>
-                  <a:fillRect l="-29947" t="-48951" r="-11230" b="-77622"/>
+                  <a:fillRect l="-28042" t="-48951" r="-12169" b="-77622"/>
                 </a:stretch>
               </a:blipFill>
             </p:spPr>
@@ -11062,7 +11088,7 @@
             <p:spPr>
               <a:xfrm>
                 <a:off x="6200951" y="4577475"/>
-                <a:ext cx="895438" cy="230832"/>
+                <a:ext cx="834267" cy="230832"/>
               </a:xfrm>
               <a:prstGeom prst="rect">
                 <a:avLst/>
@@ -11084,7 +11110,7 @@
                       <m:sSub>
                         <m:sSubPr>
                           <m:ctrlPr>
-                            <a:rPr lang="ko-KR" altLang="ko-KR" sz="900" i="1">
+                            <a:rPr lang="ko-KR" altLang="ko-KR" sz="900" i="1" smtClean="0">
                               <a:latin typeface="Cambria Math"/>
                             </a:rPr>
                           </m:ctrlPr>
@@ -11102,10 +11128,10 @@
                         </m:e>
                         <m:sub>
                           <m:r>
-                            <a:rPr lang="en-US" altLang="ko-KR" sz="900" i="1">
-                              <a:latin typeface="Cambria Math"/>
-                            </a:rPr>
-                            <m:t>𝑘</m:t>
+                            <a:rPr lang="en-US" altLang="ko-KR" sz="900" b="0" i="1" smtClean="0">
+                              <a:latin typeface="Cambria Math"/>
+                            </a:rPr>
+                            <m:t>𝑙</m:t>
                           </m:r>
                         </m:sub>
                       </m:sSub>
@@ -11136,10 +11162,10 @@
                         </m:e>
                         <m:sub>
                           <m:r>
-                            <a:rPr lang="en-US" altLang="ko-KR" sz="900" i="1">
-                              <a:latin typeface="Cambria Math"/>
-                            </a:rPr>
-                            <m:t>𝑘</m:t>
+                            <a:rPr lang="en-US" altLang="ko-KR" sz="900" b="0" i="1" smtClean="0">
+                              <a:latin typeface="Cambria Math"/>
+                            </a:rPr>
+                            <m:t>𝑙</m:t>
                           </m:r>
                         </m:sub>
                       </m:sSub>
@@ -11167,10 +11193,10 @@
                         </m:e>
                         <m:sub>
                           <m:r>
-                            <a:rPr lang="en-US" altLang="ko-KR" sz="900" i="1">
-                              <a:latin typeface="Cambria Math"/>
-                            </a:rPr>
-                            <m:t>𝑘</m:t>
+                            <a:rPr lang="en-US" altLang="ko-KR" sz="900" b="0" i="1" smtClean="0">
+                              <a:latin typeface="Cambria Math"/>
+                            </a:rPr>
+                            <m:t>𝑙</m:t>
                           </m:r>
                         </m:sub>
                       </m:sSub>
@@ -11200,13 +11226,13 @@
             <p:spPr>
               <a:xfrm>
                 <a:off x="6200951" y="4577475"/>
-                <a:ext cx="895438" cy="230832"/>
+                <a:ext cx="834267" cy="230832"/>
               </a:xfrm>
               <a:prstGeom prst="rect">
                 <a:avLst/>
               </a:prstGeom>
               <a:blipFill rotWithShape="1">
-                <a:blip r:embed="rId36"/>
+                <a:blip r:embed="rId37"/>
                 <a:stretch>
                   <a:fillRect/>
                 </a:stretch>
@@ -11235,7 +11261,7 @@
         </p:nvSpPr>
         <p:spPr>
           <a:xfrm>
-            <a:off x="3652949" y="1401934"/>
+            <a:off x="3042684" y="1401934"/>
             <a:ext cx="216024" cy="216024"/>
           </a:xfrm>
           <a:prstGeom prst="ellipse">
@@ -11281,7 +11307,7 @@
         </p:nvSpPr>
         <p:spPr>
           <a:xfrm>
-            <a:off x="3960155" y="2131090"/>
+            <a:off x="3102465" y="2131090"/>
             <a:ext cx="216024" cy="216024"/>
           </a:xfrm>
           <a:prstGeom prst="ellipse">
@@ -11327,7 +11353,7 @@
         </p:nvSpPr>
         <p:spPr>
           <a:xfrm>
-            <a:off x="3957905" y="3921072"/>
+            <a:off x="3100215" y="4149080"/>
             <a:ext cx="216024" cy="216024"/>
           </a:xfrm>
           <a:prstGeom prst="ellipse">
@@ -11373,7 +11399,7 @@
         </p:nvSpPr>
         <p:spPr>
           <a:xfrm>
-            <a:off x="3928145" y="3364805"/>
+            <a:off x="3070455" y="3364805"/>
             <a:ext cx="221536" cy="369332"/>
           </a:xfrm>
           <a:prstGeom prst="rect">
@@ -11412,8 +11438,8 @@
         </p:nvCxnSpPr>
         <p:spPr>
           <a:xfrm flipV="1">
-            <a:off x="2877974" y="1509946"/>
-            <a:ext cx="774975" cy="10842"/>
+            <a:off x="2441096" y="1509946"/>
+            <a:ext cx="601588" cy="10842"/>
           </a:xfrm>
           <a:prstGeom prst="straightConnector1">
             <a:avLst/>
@@ -11448,8 +11474,8 @@
         </p:nvCxnSpPr>
         <p:spPr>
           <a:xfrm flipV="1">
-            <a:off x="2877974" y="1509946"/>
-            <a:ext cx="774975" cy="730922"/>
+            <a:off x="2441096" y="1509946"/>
+            <a:ext cx="601588" cy="730922"/>
           </a:xfrm>
           <a:prstGeom prst="straightConnector1">
             <a:avLst/>
@@ -11484,8 +11510,8 @@
         </p:nvCxnSpPr>
         <p:spPr>
           <a:xfrm flipV="1">
-            <a:off x="2875724" y="1509946"/>
-            <a:ext cx="777225" cy="2768159"/>
+            <a:off x="2438846" y="1509946"/>
+            <a:ext cx="603838" cy="2768159"/>
           </a:xfrm>
           <a:prstGeom prst="straightConnector1">
             <a:avLst/>
@@ -11520,8 +11546,8 @@
         </p:nvCxnSpPr>
         <p:spPr>
           <a:xfrm flipV="1">
-            <a:off x="2874665" y="1509946"/>
-            <a:ext cx="778284" cy="1519410"/>
+            <a:off x="2437787" y="1509946"/>
+            <a:ext cx="604897" cy="1519410"/>
           </a:xfrm>
           <a:prstGeom prst="straightConnector1">
             <a:avLst/>
@@ -11553,7 +11579,7 @@
         </p:nvSpPr>
         <p:spPr>
           <a:xfrm>
-            <a:off x="3966778" y="2854362"/>
+            <a:off x="3109088" y="2854362"/>
             <a:ext cx="216024" cy="216024"/>
           </a:xfrm>
           <a:prstGeom prst="ellipse">
@@ -11601,7 +11627,7 @@
             </p:nvSpPr>
             <p:spPr>
               <a:xfrm>
-                <a:off x="3231770" y="3176158"/>
+                <a:off x="2621505" y="3176158"/>
                 <a:ext cx="456663" cy="233269"/>
               </a:xfrm>
               <a:prstGeom prst="rect">
@@ -11677,14 +11703,14 @@
             </p:nvSpPr>
             <p:spPr>
               <a:xfrm>
-                <a:off x="3231770" y="3176158"/>
+                <a:off x="2621505" y="3176158"/>
                 <a:ext cx="456663" cy="233269"/>
               </a:xfrm>
               <a:prstGeom prst="rect">
                 <a:avLst/>
               </a:prstGeom>
               <a:blipFill rotWithShape="1">
-                <a:blip r:embed="rId37"/>
+                <a:blip r:embed="rId38"/>
                 <a:stretch>
                   <a:fillRect/>
                 </a:stretch>
@@ -11715,7 +11741,7 @@
             </p:nvSpPr>
             <p:spPr>
               <a:xfrm>
-                <a:off x="3215791" y="2636291"/>
+                <a:off x="2605526" y="2636291"/>
                 <a:ext cx="390299" cy="253724"/>
               </a:xfrm>
               <a:prstGeom prst="rect">
@@ -11797,14 +11823,14 @@
             </p:nvSpPr>
             <p:spPr>
               <a:xfrm>
-                <a:off x="3215791" y="2636291"/>
+                <a:off x="2605526" y="2636291"/>
                 <a:ext cx="390299" cy="253724"/>
               </a:xfrm>
               <a:prstGeom prst="rect">
                 <a:avLst/>
               </a:prstGeom>
               <a:blipFill rotWithShape="1">
-                <a:blip r:embed="rId19"/>
+                <a:blip r:embed="rId39"/>
                 <a:stretch>
                   <a:fillRect/>
                 </a:stretch>
@@ -11835,7 +11861,7 @@
             </p:nvSpPr>
             <p:spPr>
               <a:xfrm>
-                <a:off x="3233995" y="1984692"/>
+                <a:off x="2623730" y="1984692"/>
                 <a:ext cx="405880" cy="233269"/>
               </a:xfrm>
               <a:prstGeom prst="rect">
@@ -11911,14 +11937,14 @@
             </p:nvSpPr>
             <p:spPr>
               <a:xfrm>
-                <a:off x="3233995" y="1984692"/>
+                <a:off x="2623730" y="1984692"/>
                 <a:ext cx="405880" cy="233269"/>
               </a:xfrm>
               <a:prstGeom prst="rect">
                 <a:avLst/>
               </a:prstGeom>
               <a:blipFill rotWithShape="1">
-                <a:blip r:embed="rId38"/>
+                <a:blip r:embed="rId40"/>
                 <a:stretch>
                   <a:fillRect/>
                 </a:stretch>
@@ -11949,7 +11975,7 @@
             </p:nvSpPr>
             <p:spPr>
               <a:xfrm>
-                <a:off x="3182607" y="1557141"/>
+                <a:off x="2572342" y="1557141"/>
                 <a:ext cx="408573" cy="233269"/>
               </a:xfrm>
               <a:prstGeom prst="rect">
@@ -12025,14 +12051,14 @@
             </p:nvSpPr>
             <p:spPr>
               <a:xfrm>
-                <a:off x="3182607" y="1557141"/>
+                <a:off x="2572342" y="1557141"/>
                 <a:ext cx="408573" cy="233269"/>
               </a:xfrm>
               <a:prstGeom prst="rect">
                 <a:avLst/>
               </a:prstGeom>
               <a:blipFill rotWithShape="1">
-                <a:blip r:embed="rId21"/>
+                <a:blip r:embed="rId41"/>
                 <a:stretch>
                   <a:fillRect/>
                 </a:stretch>
@@ -12063,7 +12089,7 @@
             </p:nvSpPr>
             <p:spPr>
               <a:xfrm>
-                <a:off x="3206437" y="764704"/>
+                <a:off x="2596172" y="987090"/>
                 <a:ext cx="395942" cy="253724"/>
               </a:xfrm>
               <a:prstGeom prst="rect">
@@ -12139,14 +12165,14 @@
             </p:nvSpPr>
             <p:spPr>
               <a:xfrm>
-                <a:off x="3206437" y="764704"/>
+                <a:off x="2596172" y="987090"/>
                 <a:ext cx="395942" cy="253724"/>
               </a:xfrm>
               <a:prstGeom prst="rect">
                 <a:avLst/>
               </a:prstGeom>
               <a:blipFill rotWithShape="1">
-                <a:blip r:embed="rId22"/>
+                <a:blip r:embed="rId42"/>
                 <a:stretch>
                   <a:fillRect/>
                 </a:stretch>
@@ -12177,7 +12203,7 @@
             </p:nvSpPr>
             <p:spPr>
               <a:xfrm>
-                <a:off x="3885246" y="2402838"/>
+                <a:off x="3027556" y="2402838"/>
                 <a:ext cx="328551" cy="232179"/>
               </a:xfrm>
               <a:prstGeom prst="rect">
@@ -12253,14 +12279,14 @@
             </p:nvSpPr>
             <p:spPr>
               <a:xfrm>
-                <a:off x="3885246" y="2402838"/>
+                <a:off x="3027556" y="2402838"/>
                 <a:ext cx="328551" cy="232179"/>
               </a:xfrm>
               <a:prstGeom prst="rect">
                 <a:avLst/>
               </a:prstGeom>
               <a:blipFill rotWithShape="1">
-                <a:blip r:embed="rId23"/>
+                <a:blip r:embed="rId43"/>
                 <a:stretch>
                   <a:fillRect/>
                 </a:stretch>
@@ -12291,7 +12317,7 @@
             </p:nvSpPr>
             <p:spPr>
               <a:xfrm>
-                <a:off x="3853826" y="778092"/>
+                <a:off x="2996136" y="1000478"/>
                 <a:ext cx="332975" cy="236027"/>
               </a:xfrm>
               <a:prstGeom prst="rect">
@@ -12367,14 +12393,14 @@
             </p:nvSpPr>
             <p:spPr>
               <a:xfrm>
-                <a:off x="3853826" y="778092"/>
+                <a:off x="2996136" y="1000478"/>
                 <a:ext cx="332975" cy="236027"/>
               </a:xfrm>
               <a:prstGeom prst="rect">
                 <a:avLst/>
               </a:prstGeom>
               <a:blipFill rotWithShape="1">
-                <a:blip r:embed="rId39"/>
+                <a:blip r:embed="rId44"/>
                 <a:stretch>
                   <a:fillRect/>
                 </a:stretch>
@@ -12405,7 +12431,7 @@
             </p:nvSpPr>
             <p:spPr>
               <a:xfrm>
-                <a:off x="3853825" y="1664971"/>
+                <a:off x="2996135" y="1664971"/>
                 <a:ext cx="328551" cy="233269"/>
               </a:xfrm>
               <a:prstGeom prst="rect">
@@ -12481,14 +12507,14 @@
             </p:nvSpPr>
             <p:spPr>
               <a:xfrm>
-                <a:off x="3853825" y="1664971"/>
+                <a:off x="2996135" y="1664971"/>
                 <a:ext cx="328551" cy="233269"/>
               </a:xfrm>
               <a:prstGeom prst="rect">
                 <a:avLst/>
               </a:prstGeom>
               <a:blipFill rotWithShape="1">
-                <a:blip r:embed="rId40"/>
+                <a:blip r:embed="rId45"/>
                 <a:stretch>
                   <a:fillRect/>
                 </a:stretch>
@@ -12519,7 +12545,7 @@
             </p:nvSpPr>
             <p:spPr>
               <a:xfrm>
-                <a:off x="3845514" y="3160290"/>
+                <a:off x="2987824" y="3160290"/>
                 <a:ext cx="332975" cy="236027"/>
               </a:xfrm>
               <a:prstGeom prst="rect">
@@ -12595,14 +12621,14 @@
             </p:nvSpPr>
             <p:spPr>
               <a:xfrm>
-                <a:off x="3845514" y="3160290"/>
+                <a:off x="2987824" y="3160290"/>
                 <a:ext cx="332975" cy="236027"/>
               </a:xfrm>
               <a:prstGeom prst="rect">
                 <a:avLst/>
               </a:prstGeom>
               <a:blipFill rotWithShape="1">
-                <a:blip r:embed="rId41"/>
+                <a:blip r:embed="rId46"/>
                 <a:stretch>
                   <a:fillRect/>
                 </a:stretch>
@@ -12633,8 +12659,8 @@
             </p:nvSpPr>
             <p:spPr>
               <a:xfrm>
-                <a:off x="3879058" y="4209154"/>
-                <a:ext cx="328551" cy="233141"/>
+                <a:off x="3021368" y="4437162"/>
+                <a:ext cx="372218" cy="233141"/>
               </a:xfrm>
               <a:prstGeom prst="rect">
                 <a:avLst/>
@@ -12678,7 +12704,7 @@
                             <a:rPr lang="en-US" altLang="ko-KR" sz="900" b="0" i="1" smtClean="0">
                               <a:latin typeface="Cambria Math"/>
                             </a:rPr>
-                            <m:t>9</m:t>
+                            <m:t>99</m:t>
                           </m:r>
                         </m:sub>
                         <m:sup>
@@ -12709,14 +12735,14 @@
             </p:nvSpPr>
             <p:spPr>
               <a:xfrm>
-                <a:off x="3879058" y="4209154"/>
-                <a:ext cx="328551" cy="233141"/>
+                <a:off x="3021368" y="4437162"/>
+                <a:ext cx="372218" cy="233141"/>
               </a:xfrm>
               <a:prstGeom prst="rect">
                 <a:avLst/>
               </a:prstGeom>
               <a:blipFill rotWithShape="1">
-                <a:blip r:embed="rId26"/>
+                <a:blip r:embed="rId47"/>
                 <a:stretch>
                   <a:fillRect/>
                 </a:stretch>
@@ -12747,7 +12773,7 @@
             </p:nvSpPr>
             <p:spPr>
               <a:xfrm>
-                <a:off x="3022025" y="3962383"/>
+                <a:off x="2411760" y="3962383"/>
                 <a:ext cx="722762" cy="233269"/>
               </a:xfrm>
               <a:prstGeom prst="rect">
@@ -12865,14 +12891,1480 @@
             </p:nvSpPr>
             <p:spPr>
               <a:xfrm>
-                <a:off x="3022025" y="3962383"/>
+                <a:off x="2411760" y="3962383"/>
                 <a:ext cx="722762" cy="233269"/>
               </a:xfrm>
               <a:prstGeom prst="rect">
                 <a:avLst/>
               </a:prstGeom>
               <a:blipFill rotWithShape="1">
-                <a:blip r:embed="rId42"/>
+                <a:blip r:embed="rId48"/>
+                <a:stretch>
+                  <a:fillRect/>
+                </a:stretch>
+              </a:blipFill>
+            </p:spPr>
+            <p:txBody>
+              <a:bodyPr/>
+              <a:lstStyle/>
+              <a:p>
+                <a:r>
+                  <a:rPr lang="ko-KR" altLang="en-US">
+                    <a:noFill/>
+                  </a:rPr>
+                  <a:t> </a:t>
+                </a:r>
+              </a:p>
+            </p:txBody>
+          </p:sp>
+        </mc:Fallback>
+      </mc:AlternateContent>
+      <p:sp>
+        <p:nvSpPr>
+          <p:cNvPr id="143" name="타원 142"/>
+          <p:cNvSpPr/>
+          <p:nvPr/>
+        </p:nvSpPr>
+        <p:spPr>
+          <a:xfrm>
+            <a:off x="3812799" y="1398808"/>
+            <a:ext cx="216024" cy="216024"/>
+          </a:xfrm>
+          <a:prstGeom prst="ellipse">
+            <a:avLst/>
+          </a:prstGeom>
+          <a:noFill/>
+          <a:ln>
+            <a:solidFill>
+              <a:schemeClr val="tx1"/>
+            </a:solidFill>
+          </a:ln>
+        </p:spPr>
+        <p:style>
+          <a:lnRef idx="2">
+            <a:schemeClr val="accent1">
+              <a:shade val="50000"/>
+            </a:schemeClr>
+          </a:lnRef>
+          <a:fillRef idx="1">
+            <a:schemeClr val="accent1"/>
+          </a:fillRef>
+          <a:effectRef idx="0">
+            <a:schemeClr val="accent1"/>
+          </a:effectRef>
+          <a:fontRef idx="minor">
+            <a:schemeClr val="lt1"/>
+          </a:fontRef>
+        </p:style>
+        <p:txBody>
+          <a:bodyPr rtlCol="0" anchor="ctr"/>
+          <a:lstStyle/>
+          <a:p>
+            <a:pPr algn="ctr"/>
+            <a:endParaRPr lang="ko-KR" altLang="en-US" sz="900" dirty="0"/>
+          </a:p>
+        </p:txBody>
+      </p:sp>
+      <p:sp>
+        <p:nvSpPr>
+          <p:cNvPr id="144" name="타원 143"/>
+          <p:cNvSpPr/>
+          <p:nvPr/>
+        </p:nvSpPr>
+        <p:spPr>
+          <a:xfrm>
+            <a:off x="3812799" y="2118888"/>
+            <a:ext cx="216024" cy="216024"/>
+          </a:xfrm>
+          <a:prstGeom prst="ellipse">
+            <a:avLst/>
+          </a:prstGeom>
+          <a:noFill/>
+          <a:ln>
+            <a:solidFill>
+              <a:schemeClr val="tx1"/>
+            </a:solidFill>
+          </a:ln>
+        </p:spPr>
+        <p:style>
+          <a:lnRef idx="2">
+            <a:schemeClr val="accent1">
+              <a:shade val="50000"/>
+            </a:schemeClr>
+          </a:lnRef>
+          <a:fillRef idx="1">
+            <a:schemeClr val="accent1"/>
+          </a:fillRef>
+          <a:effectRef idx="0">
+            <a:schemeClr val="accent1"/>
+          </a:effectRef>
+          <a:fontRef idx="minor">
+            <a:schemeClr val="lt1"/>
+          </a:fontRef>
+        </p:style>
+        <p:txBody>
+          <a:bodyPr rtlCol="0" anchor="ctr"/>
+          <a:lstStyle/>
+          <a:p>
+            <a:pPr algn="ctr"/>
+            <a:endParaRPr lang="ko-KR" altLang="en-US" sz="900" dirty="0"/>
+          </a:p>
+        </p:txBody>
+      </p:sp>
+      <p:sp>
+        <p:nvSpPr>
+          <p:cNvPr id="156" name="타원 155"/>
+          <p:cNvSpPr/>
+          <p:nvPr/>
+        </p:nvSpPr>
+        <p:spPr>
+          <a:xfrm>
+            <a:off x="3810549" y="4135263"/>
+            <a:ext cx="216024" cy="216024"/>
+          </a:xfrm>
+          <a:prstGeom prst="ellipse">
+            <a:avLst/>
+          </a:prstGeom>
+          <a:noFill/>
+          <a:ln>
+            <a:solidFill>
+              <a:schemeClr val="tx1"/>
+            </a:solidFill>
+          </a:ln>
+        </p:spPr>
+        <p:style>
+          <a:lnRef idx="2">
+            <a:schemeClr val="accent1">
+              <a:shade val="50000"/>
+            </a:schemeClr>
+          </a:lnRef>
+          <a:fillRef idx="1">
+            <a:schemeClr val="accent1"/>
+          </a:fillRef>
+          <a:effectRef idx="0">
+            <a:schemeClr val="accent1"/>
+          </a:effectRef>
+          <a:fontRef idx="minor">
+            <a:schemeClr val="lt1"/>
+          </a:fontRef>
+        </p:style>
+        <p:txBody>
+          <a:bodyPr rtlCol="0" anchor="ctr"/>
+          <a:lstStyle/>
+          <a:p>
+            <a:pPr algn="ctr"/>
+            <a:endParaRPr lang="ko-KR" altLang="en-US" sz="900" dirty="0"/>
+          </a:p>
+        </p:txBody>
+      </p:sp>
+      <p:sp>
+        <p:nvSpPr>
+          <p:cNvPr id="159" name="TextBox 158"/>
+          <p:cNvSpPr txBox="1"/>
+          <p:nvPr/>
+        </p:nvSpPr>
+        <p:spPr>
+          <a:xfrm>
+            <a:off x="3780789" y="3483828"/>
+            <a:ext cx="221536" cy="461665"/>
+          </a:xfrm>
+          <a:prstGeom prst="rect">
+            <a:avLst/>
+          </a:prstGeom>
+          <a:noFill/>
+        </p:spPr>
+        <p:txBody>
+          <a:bodyPr wrap="none" rtlCol="0">
+            <a:spAutoFit/>
+          </a:bodyPr>
+          <a:lstStyle/>
+          <a:p>
+            <a:r>
+              <a:rPr lang="en-US" altLang="ko-KR" sz="900" b="1" dirty="0" smtClean="0"/>
+              <a:t>∙</a:t>
+            </a:r>
+          </a:p>
+          <a:p>
+            <a:r>
+              <a:rPr lang="en-US" altLang="ko-KR" sz="900" b="1" dirty="0" smtClean="0"/>
+              <a:t>∙</a:t>
+            </a:r>
+            <a:endParaRPr lang="en-US" altLang="ko-KR" sz="900" b="1" dirty="0"/>
+          </a:p>
+          <a:p>
+            <a:endParaRPr lang="ko-KR" altLang="en-US" sz="900" b="1" baseline="-25000" dirty="0"/>
+          </a:p>
+        </p:txBody>
+      </p:sp>
+      <p:sp>
+        <p:nvSpPr>
+          <p:cNvPr id="160" name="타원 159"/>
+          <p:cNvSpPr/>
+          <p:nvPr/>
+        </p:nvSpPr>
+        <p:spPr>
+          <a:xfrm>
+            <a:off x="3809490" y="2852936"/>
+            <a:ext cx="216024" cy="216024"/>
+          </a:xfrm>
+          <a:prstGeom prst="ellipse">
+            <a:avLst/>
+          </a:prstGeom>
+          <a:noFill/>
+          <a:ln>
+            <a:solidFill>
+              <a:schemeClr val="tx1"/>
+            </a:solidFill>
+          </a:ln>
+        </p:spPr>
+        <p:style>
+          <a:lnRef idx="2">
+            <a:schemeClr val="accent1">
+              <a:shade val="50000"/>
+            </a:schemeClr>
+          </a:lnRef>
+          <a:fillRef idx="1">
+            <a:schemeClr val="accent1"/>
+          </a:fillRef>
+          <a:effectRef idx="0">
+            <a:schemeClr val="accent1"/>
+          </a:effectRef>
+          <a:fontRef idx="minor">
+            <a:schemeClr val="lt1"/>
+          </a:fontRef>
+        </p:style>
+        <p:txBody>
+          <a:bodyPr rtlCol="0" anchor="ctr"/>
+          <a:lstStyle/>
+          <a:p>
+            <a:pPr algn="ctr"/>
+            <a:endParaRPr lang="ko-KR" altLang="en-US" sz="900" dirty="0"/>
+          </a:p>
+        </p:txBody>
+      </p:sp>
+      <mc:AlternateContent xmlns:mc="http://schemas.openxmlformats.org/markup-compatibility/2006">
+        <mc:Choice xmlns:a14="http://schemas.microsoft.com/office/drawing/2010/main" Requires="a14">
+          <p:sp>
+            <p:nvSpPr>
+              <p:cNvPr id="162" name="TextBox 161"/>
+              <p:cNvSpPr txBox="1"/>
+              <p:nvPr/>
+            </p:nvSpPr>
+            <p:spPr>
+              <a:xfrm>
+                <a:off x="3685002" y="999914"/>
+                <a:ext cx="334579" cy="236027"/>
+              </a:xfrm>
+              <a:prstGeom prst="rect">
+                <a:avLst/>
+              </a:prstGeom>
+              <a:noFill/>
+            </p:spPr>
+            <p:txBody>
+              <a:bodyPr wrap="none" rtlCol="0">
+                <a:spAutoFit/>
+              </a:bodyPr>
+              <a:lstStyle/>
+              <a:p>
+                <a:pPr/>
+                <a14:m>
+                  <m:oMathPara xmlns:m="http://schemas.openxmlformats.org/officeDocument/2006/math">
+                    <m:oMathParaPr>
+                      <m:jc m:val="centerGroup"/>
+                    </m:oMathParaPr>
+                    <m:oMath xmlns:m="http://schemas.openxmlformats.org/officeDocument/2006/math">
+                      <m:sSubSup>
+                        <m:sSubSupPr>
+                          <m:ctrlPr>
+                            <a:rPr lang="ko-KR" altLang="ko-KR" sz="900" i="1" smtClean="0">
+                              <a:latin typeface="Cambria Math"/>
+                            </a:rPr>
+                          </m:ctrlPr>
+                        </m:sSubSupPr>
+                        <m:e>
+                          <m:r>
+                            <m:rPr>
+                              <m:sty m:val="p"/>
+                            </m:rPr>
+                            <a:rPr lang="en-US" altLang="ko-KR" sz="900" b="0" i="0" smtClean="0">
+                              <a:latin typeface="Cambria Math"/>
+                            </a:rPr>
+                            <m:t>h</m:t>
+                          </m:r>
+                        </m:e>
+                        <m:sub>
+                          <m:r>
+                            <a:rPr lang="en-US" altLang="ko-KR" sz="900" b="0" i="1" smtClean="0">
+                              <a:latin typeface="Cambria Math"/>
+                            </a:rPr>
+                            <m:t>𝑘</m:t>
+                          </m:r>
+                        </m:sub>
+                        <m:sup>
+                          <m:r>
+                            <a:rPr lang="en-US" altLang="ko-KR" sz="900" b="0" i="1" smtClean="0">
+                              <a:latin typeface="Cambria Math"/>
+                            </a:rPr>
+                            <m:t>1</m:t>
+                          </m:r>
+                        </m:sup>
+                      </m:sSubSup>
+                    </m:oMath>
+                  </m:oMathPara>
+                </a14:m>
+                <a:endParaRPr lang="ko-KR" altLang="en-US" sz="900" baseline="-25000" dirty="0"/>
+              </a:p>
+            </p:txBody>
+          </p:sp>
+        </mc:Choice>
+        <mc:Fallback>
+          <p:sp>
+            <p:nvSpPr>
+              <p:cNvPr id="162" name="TextBox 161"/>
+              <p:cNvSpPr txBox="1">
+                <a:spLocks noRot="1" noChangeAspect="1" noMove="1" noResize="1" noEditPoints="1" noAdjustHandles="1" noChangeArrowheads="1" noChangeShapeType="1" noTextEdit="1"/>
+              </p:cNvSpPr>
+              <p:nvPr/>
+            </p:nvSpPr>
+            <p:spPr>
+              <a:xfrm>
+                <a:off x="3685002" y="999914"/>
+                <a:ext cx="334579" cy="236027"/>
+              </a:xfrm>
+              <a:prstGeom prst="rect">
+                <a:avLst/>
+              </a:prstGeom>
+              <a:blipFill rotWithShape="1">
+                <a:blip r:embed="rId49"/>
+                <a:stretch>
+                  <a:fillRect/>
+                </a:stretch>
+              </a:blipFill>
+            </p:spPr>
+            <p:txBody>
+              <a:bodyPr/>
+              <a:lstStyle/>
+              <a:p>
+                <a:r>
+                  <a:rPr lang="ko-KR" altLang="en-US">
+                    <a:noFill/>
+                  </a:rPr>
+                  <a:t> </a:t>
+                </a:r>
+              </a:p>
+            </p:txBody>
+          </p:sp>
+        </mc:Fallback>
+      </mc:AlternateContent>
+      <mc:AlternateContent xmlns:mc="http://schemas.openxmlformats.org/markup-compatibility/2006">
+        <mc:Choice xmlns:a14="http://schemas.microsoft.com/office/drawing/2010/main" Requires="a14">
+          <p:sp>
+            <p:nvSpPr>
+              <p:cNvPr id="170" name="직사각형 169"/>
+              <p:cNvSpPr/>
+              <p:nvPr/>
+            </p:nvSpPr>
+            <p:spPr>
+              <a:xfrm>
+                <a:off x="2321812" y="4705116"/>
+                <a:ext cx="1254948" cy="497444"/>
+              </a:xfrm>
+              <a:prstGeom prst="rect">
+                <a:avLst/>
+              </a:prstGeom>
+            </p:spPr>
+            <p:txBody>
+              <a:bodyPr wrap="square">
+                <a:spAutoFit/>
+              </a:bodyPr>
+              <a:lstStyle/>
+              <a:p>
+                <a:pPr/>
+                <a14:m>
+                  <m:oMathPara xmlns:m="http://schemas.openxmlformats.org/officeDocument/2006/math">
+                    <m:oMathParaPr>
+                      <m:jc m:val="centerGroup"/>
+                    </m:oMathParaPr>
+                    <m:oMath xmlns:m="http://schemas.openxmlformats.org/officeDocument/2006/math">
+                      <m:nary>
+                        <m:naryPr>
+                          <m:chr m:val="∑"/>
+                          <m:limLoc m:val="undOvr"/>
+                          <m:ctrlPr>
+                            <a:rPr lang="ko-KR" altLang="ko-KR" sz="900" i="1" smtClean="0">
+                              <a:latin typeface="Cambria Math"/>
+                            </a:rPr>
+                          </m:ctrlPr>
+                        </m:naryPr>
+                        <m:sub>
+                          <m:r>
+                            <m:rPr>
+                              <m:brk/>
+                            </m:rPr>
+                            <a:rPr lang="en-US" altLang="ko-KR" sz="900" b="0" i="1" smtClean="0">
+                              <a:latin typeface="Cambria Math"/>
+                            </a:rPr>
+                            <m:t>𝑗</m:t>
+                          </m:r>
+                          <m:r>
+                            <a:rPr lang="en-US" altLang="ko-KR" sz="900" i="1">
+                              <a:latin typeface="Cambria Math"/>
+                            </a:rPr>
+                            <m:t>=0</m:t>
+                          </m:r>
+                        </m:sub>
+                        <m:sup>
+                          <m:r>
+                            <a:rPr lang="en-US" altLang="ko-KR" sz="900" b="0" i="1" smtClean="0">
+                              <a:latin typeface="Cambria Math"/>
+                            </a:rPr>
+                            <m:t>64</m:t>
+                          </m:r>
+                        </m:sup>
+                        <m:e>
+                          <m:sSubSup>
+                            <m:sSubSupPr>
+                              <m:ctrlPr>
+                                <a:rPr lang="ko-KR" altLang="ko-KR" sz="900" i="1">
+                                  <a:latin typeface="Cambria Math"/>
+                                </a:rPr>
+                              </m:ctrlPr>
+                            </m:sSubSupPr>
+                            <m:e>
+                              <m:r>
+                                <m:rPr>
+                                  <m:sty m:val="p"/>
+                                </m:rPr>
+                                <a:rPr lang="en-US" altLang="ko-KR" sz="900">
+                                  <a:latin typeface="Cambria Math"/>
+                                </a:rPr>
+                                <m:t>h</m:t>
+                              </m:r>
+                            </m:e>
+                            <m:sub>
+                              <m:r>
+                                <a:rPr lang="en-US" altLang="ko-KR" sz="900" b="0" i="1" smtClean="0">
+                                  <a:latin typeface="Cambria Math"/>
+                                </a:rPr>
+                                <m:t>𝑗</m:t>
+                              </m:r>
+                            </m:sub>
+                            <m:sup>
+                              <m:r>
+                                <a:rPr lang="en-US" altLang="ko-KR" sz="900" b="0" i="1" smtClean="0">
+                                  <a:latin typeface="Cambria Math"/>
+                                </a:rPr>
+                                <m:t>0</m:t>
+                              </m:r>
+                            </m:sup>
+                          </m:sSubSup>
+                        </m:e>
+                      </m:nary>
+                      <m:r>
+                        <a:rPr lang="en-US" altLang="ko-KR" sz="900" i="1">
+                          <a:latin typeface="Cambria Math"/>
+                        </a:rPr>
+                        <m:t>∗</m:t>
+                      </m:r>
+                      <m:sSubSup>
+                        <m:sSubSupPr>
+                          <m:ctrlPr>
+                            <a:rPr lang="ko-KR" altLang="ko-KR" sz="900" i="1">
+                              <a:latin typeface="Cambria Math"/>
+                            </a:rPr>
+                          </m:ctrlPr>
+                        </m:sSubSupPr>
+                        <m:e>
+                          <m:r>
+                            <a:rPr lang="en-US" altLang="ko-KR" sz="900" i="1">
+                              <a:latin typeface="Cambria Math"/>
+                            </a:rPr>
+                            <m:t>𝑊</m:t>
+                          </m:r>
+                        </m:e>
+                        <m:sub>
+                          <m:r>
+                            <a:rPr lang="en-US" altLang="ko-KR" sz="900" b="0" i="1" smtClean="0">
+                              <a:latin typeface="Cambria Math"/>
+                            </a:rPr>
+                            <m:t>𝑗𝑘</m:t>
+                          </m:r>
+                        </m:sub>
+                        <m:sup>
+                          <m:r>
+                            <a:rPr lang="en-US" altLang="ko-KR" sz="900" b="0" i="1" smtClean="0">
+                              <a:latin typeface="Cambria Math"/>
+                            </a:rPr>
+                            <m:t>1</m:t>
+                          </m:r>
+                        </m:sup>
+                      </m:sSubSup>
+                      <m:sSubSup>
+                        <m:sSubSupPr>
+                          <m:ctrlPr>
+                            <a:rPr lang="ko-KR" altLang="ko-KR" sz="900" i="1">
+                              <a:latin typeface="Cambria Math"/>
+                            </a:rPr>
+                          </m:ctrlPr>
+                        </m:sSubSupPr>
+                        <m:e>
+                          <m:r>
+                            <a:rPr lang="en-US" altLang="ko-KR" sz="900" b="0" i="0" smtClean="0">
+                              <a:latin typeface="Cambria Math"/>
+                            </a:rPr>
+                            <m:t>=</m:t>
+                          </m:r>
+                          <m:r>
+                            <m:rPr>
+                              <m:sty m:val="p"/>
+                            </m:rPr>
+                            <a:rPr lang="en-US" altLang="ko-KR" sz="900">
+                              <a:latin typeface="Cambria Math"/>
+                            </a:rPr>
+                            <m:t>Z</m:t>
+                          </m:r>
+                        </m:e>
+                        <m:sub>
+                          <m:r>
+                            <a:rPr lang="en-US" altLang="ko-KR" sz="900" i="1">
+                              <a:latin typeface="Cambria Math"/>
+                            </a:rPr>
+                            <m:t>𝑘</m:t>
+                          </m:r>
+                        </m:sub>
+                        <m:sup>
+                          <m:r>
+                            <a:rPr lang="en-US" altLang="ko-KR" sz="900" b="0" i="1" smtClean="0">
+                              <a:latin typeface="Cambria Math"/>
+                            </a:rPr>
+                            <m:t>1</m:t>
+                          </m:r>
+                        </m:sup>
+                      </m:sSubSup>
+                    </m:oMath>
+                  </m:oMathPara>
+                </a14:m>
+                <a:endParaRPr lang="ko-KR" altLang="ko-KR" sz="900" dirty="0"/>
+              </a:p>
+            </p:txBody>
+          </p:sp>
+        </mc:Choice>
+        <mc:Fallback>
+          <p:sp>
+            <p:nvSpPr>
+              <p:cNvPr id="170" name="직사각형 169"/>
+              <p:cNvSpPr>
+                <a:spLocks noRot="1" noChangeAspect="1" noMove="1" noResize="1" noEditPoints="1" noAdjustHandles="1" noChangeArrowheads="1" noChangeShapeType="1" noTextEdit="1"/>
+              </p:cNvSpPr>
+              <p:nvPr/>
+            </p:nvSpPr>
+            <p:spPr>
+              <a:xfrm>
+                <a:off x="2321812" y="4705116"/>
+                <a:ext cx="1254948" cy="497444"/>
+              </a:xfrm>
+              <a:prstGeom prst="rect">
+                <a:avLst/>
+              </a:prstGeom>
+              <a:blipFill rotWithShape="1">
+                <a:blip r:embed="rId50"/>
+                <a:stretch>
+                  <a:fillRect l="-19903" t="-86420" b="-134568"/>
+                </a:stretch>
+              </a:blipFill>
+            </p:spPr>
+            <p:txBody>
+              <a:bodyPr/>
+              <a:lstStyle/>
+              <a:p>
+                <a:r>
+                  <a:rPr lang="ko-KR" altLang="en-US">
+                    <a:noFill/>
+                  </a:rPr>
+                  <a:t> </a:t>
+                </a:r>
+              </a:p>
+            </p:txBody>
+          </p:sp>
+        </mc:Fallback>
+      </mc:AlternateContent>
+      <p:cxnSp>
+        <p:nvCxnSpPr>
+          <p:cNvPr id="171" name="직선 화살표 연결선 170"/>
+          <p:cNvCxnSpPr>
+            <a:stCxn id="237" idx="6"/>
+            <a:endCxn id="143" idx="2"/>
+          </p:cNvCxnSpPr>
+          <p:nvPr/>
+        </p:nvCxnSpPr>
+        <p:spPr>
+          <a:xfrm flipV="1">
+            <a:off x="3258708" y="1506820"/>
+            <a:ext cx="554091" cy="3126"/>
+          </a:xfrm>
+          <a:prstGeom prst="straightConnector1">
+            <a:avLst/>
+          </a:prstGeom>
+          <a:ln w="15875">
+            <a:tailEnd type="arrow"/>
+          </a:ln>
+        </p:spPr>
+        <p:style>
+          <a:lnRef idx="1">
+            <a:schemeClr val="accent1"/>
+          </a:lnRef>
+          <a:fillRef idx="0">
+            <a:schemeClr val="accent1"/>
+          </a:fillRef>
+          <a:effectRef idx="0">
+            <a:schemeClr val="accent1"/>
+          </a:effectRef>
+          <a:fontRef idx="minor">
+            <a:schemeClr val="tx1"/>
+          </a:fontRef>
+        </p:style>
+      </p:cxnSp>
+      <p:cxnSp>
+        <p:nvCxnSpPr>
+          <p:cNvPr id="172" name="직선 화살표 연결선 171"/>
+          <p:cNvCxnSpPr>
+            <a:stCxn id="238" idx="6"/>
+            <a:endCxn id="144" idx="2"/>
+          </p:cNvCxnSpPr>
+          <p:nvPr/>
+        </p:nvCxnSpPr>
+        <p:spPr>
+          <a:xfrm flipV="1">
+            <a:off x="3318489" y="2226900"/>
+            <a:ext cx="494310" cy="12202"/>
+          </a:xfrm>
+          <a:prstGeom prst="straightConnector1">
+            <a:avLst/>
+          </a:prstGeom>
+          <a:ln w="15875">
+            <a:tailEnd type="arrow"/>
+          </a:ln>
+        </p:spPr>
+        <p:style>
+          <a:lnRef idx="1">
+            <a:schemeClr val="accent1"/>
+          </a:lnRef>
+          <a:fillRef idx="0">
+            <a:schemeClr val="accent1"/>
+          </a:fillRef>
+          <a:effectRef idx="0">
+            <a:schemeClr val="accent1"/>
+          </a:effectRef>
+          <a:fontRef idx="minor">
+            <a:schemeClr val="tx1"/>
+          </a:fontRef>
+        </p:style>
+      </p:cxnSp>
+      <p:cxnSp>
+        <p:nvCxnSpPr>
+          <p:cNvPr id="173" name="직선 화살표 연결선 172"/>
+          <p:cNvCxnSpPr>
+            <a:stCxn id="239" idx="6"/>
+            <a:endCxn id="156" idx="2"/>
+          </p:cNvCxnSpPr>
+          <p:nvPr/>
+        </p:nvCxnSpPr>
+        <p:spPr>
+          <a:xfrm flipV="1">
+            <a:off x="3316239" y="4243275"/>
+            <a:ext cx="494310" cy="13817"/>
+          </a:xfrm>
+          <a:prstGeom prst="straightConnector1">
+            <a:avLst/>
+          </a:prstGeom>
+          <a:ln w="15875">
+            <a:tailEnd type="arrow"/>
+          </a:ln>
+        </p:spPr>
+        <p:style>
+          <a:lnRef idx="1">
+            <a:schemeClr val="accent1"/>
+          </a:lnRef>
+          <a:fillRef idx="0">
+            <a:schemeClr val="accent1"/>
+          </a:fillRef>
+          <a:effectRef idx="0">
+            <a:schemeClr val="accent1"/>
+          </a:effectRef>
+          <a:fontRef idx="minor">
+            <a:schemeClr val="tx1"/>
+          </a:fontRef>
+        </p:style>
+      </p:cxnSp>
+      <p:cxnSp>
+        <p:nvCxnSpPr>
+          <p:cNvPr id="174" name="직선 화살표 연결선 173"/>
+          <p:cNvCxnSpPr>
+            <a:stCxn id="245" idx="6"/>
+            <a:endCxn id="160" idx="2"/>
+          </p:cNvCxnSpPr>
+          <p:nvPr/>
+        </p:nvCxnSpPr>
+        <p:spPr>
+          <a:xfrm flipV="1">
+            <a:off x="3325112" y="2960948"/>
+            <a:ext cx="484378" cy="1426"/>
+          </a:xfrm>
+          <a:prstGeom prst="straightConnector1">
+            <a:avLst/>
+          </a:prstGeom>
+          <a:ln w="15875">
+            <a:tailEnd type="arrow"/>
+          </a:ln>
+        </p:spPr>
+        <p:style>
+          <a:lnRef idx="1">
+            <a:schemeClr val="accent1"/>
+          </a:lnRef>
+          <a:fillRef idx="0">
+            <a:schemeClr val="accent1"/>
+          </a:fillRef>
+          <a:effectRef idx="0">
+            <a:schemeClr val="accent1"/>
+          </a:effectRef>
+          <a:fontRef idx="minor">
+            <a:schemeClr val="tx1"/>
+          </a:fontRef>
+        </p:style>
+      </p:cxnSp>
+      <mc:AlternateContent xmlns:mc="http://schemas.openxmlformats.org/markup-compatibility/2006">
+        <mc:Choice xmlns:a14="http://schemas.microsoft.com/office/drawing/2010/main" Requires="a14">
+          <p:sp>
+            <p:nvSpPr>
+              <p:cNvPr id="175" name="TextBox 174"/>
+              <p:cNvSpPr txBox="1"/>
+              <p:nvPr/>
+            </p:nvSpPr>
+            <p:spPr>
+              <a:xfrm>
+                <a:off x="3733027" y="1716254"/>
+                <a:ext cx="328936" cy="233269"/>
+              </a:xfrm>
+              <a:prstGeom prst="rect">
+                <a:avLst/>
+              </a:prstGeom>
+              <a:noFill/>
+            </p:spPr>
+            <p:txBody>
+              <a:bodyPr wrap="none" rtlCol="0">
+                <a:spAutoFit/>
+              </a:bodyPr>
+              <a:lstStyle/>
+              <a:p>
+                <a:pPr/>
+                <a14:m>
+                  <m:oMathPara xmlns:m="http://schemas.openxmlformats.org/officeDocument/2006/math">
+                    <m:oMathParaPr>
+                      <m:jc m:val="centerGroup"/>
+                    </m:oMathParaPr>
+                    <m:oMath xmlns:m="http://schemas.openxmlformats.org/officeDocument/2006/math">
+                      <m:sSubSup>
+                        <m:sSubSupPr>
+                          <m:ctrlPr>
+                            <a:rPr lang="ko-KR" altLang="ko-KR" sz="900" i="1" smtClean="0">
+                              <a:latin typeface="Cambria Math"/>
+                            </a:rPr>
+                          </m:ctrlPr>
+                        </m:sSubSupPr>
+                        <m:e>
+                          <m:r>
+                            <m:rPr>
+                              <m:sty m:val="p"/>
+                            </m:rPr>
+                            <a:rPr lang="en-US" altLang="ko-KR" sz="900" b="0" i="0" smtClean="0">
+                              <a:latin typeface="Cambria Math"/>
+                            </a:rPr>
+                            <m:t>h</m:t>
+                          </m:r>
+                        </m:e>
+                        <m:sub>
+                          <m:r>
+                            <a:rPr lang="en-US" altLang="ko-KR" sz="900" b="0" i="1" smtClean="0">
+                              <a:latin typeface="Cambria Math"/>
+                            </a:rPr>
+                            <m:t>0</m:t>
+                          </m:r>
+                        </m:sub>
+                        <m:sup>
+                          <m:r>
+                            <a:rPr lang="en-US" altLang="ko-KR" sz="900" b="0" i="1" smtClean="0">
+                              <a:latin typeface="Cambria Math"/>
+                            </a:rPr>
+                            <m:t>1</m:t>
+                          </m:r>
+                        </m:sup>
+                      </m:sSubSup>
+                    </m:oMath>
+                  </m:oMathPara>
+                </a14:m>
+                <a:endParaRPr lang="ko-KR" altLang="en-US" sz="900" baseline="-25000" dirty="0"/>
+              </a:p>
+            </p:txBody>
+          </p:sp>
+        </mc:Choice>
+        <mc:Fallback>
+          <p:sp>
+            <p:nvSpPr>
+              <p:cNvPr id="175" name="TextBox 174"/>
+              <p:cNvSpPr txBox="1">
+                <a:spLocks noRot="1" noChangeAspect="1" noMove="1" noResize="1" noEditPoints="1" noAdjustHandles="1" noChangeArrowheads="1" noChangeShapeType="1" noTextEdit="1"/>
+              </p:cNvSpPr>
+              <p:nvPr/>
+            </p:nvSpPr>
+            <p:spPr>
+              <a:xfrm>
+                <a:off x="3733027" y="1716254"/>
+                <a:ext cx="328936" cy="233269"/>
+              </a:xfrm>
+              <a:prstGeom prst="rect">
+                <a:avLst/>
+              </a:prstGeom>
+              <a:blipFill rotWithShape="1">
+                <a:blip r:embed="rId51"/>
+                <a:stretch>
+                  <a:fillRect/>
+                </a:stretch>
+              </a:blipFill>
+            </p:spPr>
+            <p:txBody>
+              <a:bodyPr/>
+              <a:lstStyle/>
+              <a:p>
+                <a:r>
+                  <a:rPr lang="ko-KR" altLang="en-US">
+                    <a:noFill/>
+                  </a:rPr>
+                  <a:t> </a:t>
+                </a:r>
+              </a:p>
+            </p:txBody>
+          </p:sp>
+        </mc:Fallback>
+      </mc:AlternateContent>
+      <mc:AlternateContent xmlns:mc="http://schemas.openxmlformats.org/markup-compatibility/2006">
+        <mc:Choice xmlns:a14="http://schemas.microsoft.com/office/drawing/2010/main" Requires="a14">
+          <p:sp>
+            <p:nvSpPr>
+              <p:cNvPr id="176" name="TextBox 175"/>
+              <p:cNvSpPr txBox="1"/>
+              <p:nvPr/>
+            </p:nvSpPr>
+            <p:spPr>
+              <a:xfrm>
+                <a:off x="3753521" y="2427837"/>
+                <a:ext cx="326500" cy="232179"/>
+              </a:xfrm>
+              <a:prstGeom prst="rect">
+                <a:avLst/>
+              </a:prstGeom>
+              <a:noFill/>
+            </p:spPr>
+            <p:txBody>
+              <a:bodyPr wrap="none" rtlCol="0">
+                <a:spAutoFit/>
+              </a:bodyPr>
+              <a:lstStyle/>
+              <a:p>
+                <a:pPr/>
+                <a14:m>
+                  <m:oMathPara xmlns:m="http://schemas.openxmlformats.org/officeDocument/2006/math">
+                    <m:oMathParaPr>
+                      <m:jc m:val="centerGroup"/>
+                    </m:oMathParaPr>
+                    <m:oMath xmlns:m="http://schemas.openxmlformats.org/officeDocument/2006/math">
+                      <m:sSubSup>
+                        <m:sSubSupPr>
+                          <m:ctrlPr>
+                            <a:rPr lang="ko-KR" altLang="ko-KR" sz="900" i="1" smtClean="0">
+                              <a:latin typeface="Cambria Math"/>
+                            </a:rPr>
+                          </m:ctrlPr>
+                        </m:sSubSupPr>
+                        <m:e>
+                          <m:r>
+                            <m:rPr>
+                              <m:sty m:val="p"/>
+                            </m:rPr>
+                            <a:rPr lang="en-US" altLang="ko-KR" sz="900" b="0" i="0" smtClean="0">
+                              <a:latin typeface="Cambria Math"/>
+                            </a:rPr>
+                            <m:t>h</m:t>
+                          </m:r>
+                        </m:e>
+                        <m:sub>
+                          <m:r>
+                            <a:rPr lang="en-US" altLang="ko-KR" sz="900" b="0" i="1" smtClean="0">
+                              <a:latin typeface="Cambria Math"/>
+                            </a:rPr>
+                            <m:t>1</m:t>
+                          </m:r>
+                        </m:sub>
+                        <m:sup>
+                          <m:r>
+                            <a:rPr lang="en-US" altLang="ko-KR" sz="900" b="0" i="1" smtClean="0">
+                              <a:latin typeface="Cambria Math"/>
+                            </a:rPr>
+                            <m:t>1</m:t>
+                          </m:r>
+                        </m:sup>
+                      </m:sSubSup>
+                    </m:oMath>
+                  </m:oMathPara>
+                </a14:m>
+                <a:endParaRPr lang="ko-KR" altLang="en-US" sz="900" baseline="-25000" dirty="0"/>
+              </a:p>
+            </p:txBody>
+          </p:sp>
+        </mc:Choice>
+        <mc:Fallback>
+          <p:sp>
+            <p:nvSpPr>
+              <p:cNvPr id="176" name="TextBox 175"/>
+              <p:cNvSpPr txBox="1">
+                <a:spLocks noRot="1" noChangeAspect="1" noMove="1" noResize="1" noEditPoints="1" noAdjustHandles="1" noChangeArrowheads="1" noChangeShapeType="1" noTextEdit="1"/>
+              </p:cNvSpPr>
+              <p:nvPr/>
+            </p:nvSpPr>
+            <p:spPr>
+              <a:xfrm>
+                <a:off x="3753521" y="2427837"/>
+                <a:ext cx="326500" cy="232179"/>
+              </a:xfrm>
+              <a:prstGeom prst="rect">
+                <a:avLst/>
+              </a:prstGeom>
+              <a:blipFill rotWithShape="1">
+                <a:blip r:embed="rId52"/>
+                <a:stretch>
+                  <a:fillRect/>
+                </a:stretch>
+              </a:blipFill>
+            </p:spPr>
+            <p:txBody>
+              <a:bodyPr/>
+              <a:lstStyle/>
+              <a:p>
+                <a:r>
+                  <a:rPr lang="ko-KR" altLang="en-US">
+                    <a:noFill/>
+                  </a:rPr>
+                  <a:t> </a:t>
+                </a:r>
+              </a:p>
+            </p:txBody>
+          </p:sp>
+        </mc:Fallback>
+      </mc:AlternateContent>
+      <mc:AlternateContent xmlns:mc="http://schemas.openxmlformats.org/markup-compatibility/2006">
+        <mc:Choice xmlns:a14="http://schemas.microsoft.com/office/drawing/2010/main" Requires="a14">
+          <p:sp>
+            <p:nvSpPr>
+              <p:cNvPr id="177" name="TextBox 176"/>
+              <p:cNvSpPr txBox="1"/>
+              <p:nvPr/>
+            </p:nvSpPr>
+            <p:spPr>
+              <a:xfrm>
+                <a:off x="3744542" y="3162886"/>
+                <a:ext cx="328936" cy="232436"/>
+              </a:xfrm>
+              <a:prstGeom prst="rect">
+                <a:avLst/>
+              </a:prstGeom>
+              <a:noFill/>
+            </p:spPr>
+            <p:txBody>
+              <a:bodyPr wrap="none" rtlCol="0">
+                <a:spAutoFit/>
+              </a:bodyPr>
+              <a:lstStyle/>
+              <a:p>
+                <a:pPr/>
+                <a14:m>
+                  <m:oMathPara xmlns:m="http://schemas.openxmlformats.org/officeDocument/2006/math">
+                    <m:oMathParaPr>
+                      <m:jc m:val="centerGroup"/>
+                    </m:oMathParaPr>
+                    <m:oMath xmlns:m="http://schemas.openxmlformats.org/officeDocument/2006/math">
+                      <m:sSubSup>
+                        <m:sSubSupPr>
+                          <m:ctrlPr>
+                            <a:rPr lang="ko-KR" altLang="ko-KR" sz="900" i="1" smtClean="0">
+                              <a:latin typeface="Cambria Math"/>
+                            </a:rPr>
+                          </m:ctrlPr>
+                        </m:sSubSupPr>
+                        <m:e>
+                          <m:r>
+                            <m:rPr>
+                              <m:sty m:val="p"/>
+                            </m:rPr>
+                            <a:rPr lang="en-US" altLang="ko-KR" sz="900" b="0" i="0" smtClean="0">
+                              <a:latin typeface="Cambria Math"/>
+                            </a:rPr>
+                            <m:t>h</m:t>
+                          </m:r>
+                        </m:e>
+                        <m:sub>
+                          <m:r>
+                            <a:rPr lang="en-US" altLang="ko-KR" sz="900" b="0" i="1" smtClean="0">
+                              <a:latin typeface="Cambria Math"/>
+                            </a:rPr>
+                            <m:t>2</m:t>
+                          </m:r>
+                        </m:sub>
+                        <m:sup>
+                          <m:r>
+                            <a:rPr lang="en-US" altLang="ko-KR" sz="900" b="0" i="1" smtClean="0">
+                              <a:latin typeface="Cambria Math"/>
+                            </a:rPr>
+                            <m:t>1</m:t>
+                          </m:r>
+                        </m:sup>
+                      </m:sSubSup>
+                    </m:oMath>
+                  </m:oMathPara>
+                </a14:m>
+                <a:endParaRPr lang="ko-KR" altLang="en-US" sz="900" baseline="-25000" dirty="0"/>
+              </a:p>
+            </p:txBody>
+          </p:sp>
+        </mc:Choice>
+        <mc:Fallback>
+          <p:sp>
+            <p:nvSpPr>
+              <p:cNvPr id="177" name="TextBox 176"/>
+              <p:cNvSpPr txBox="1">
+                <a:spLocks noRot="1" noChangeAspect="1" noMove="1" noResize="1" noEditPoints="1" noAdjustHandles="1" noChangeArrowheads="1" noChangeShapeType="1" noTextEdit="1"/>
+              </p:cNvSpPr>
+              <p:nvPr/>
+            </p:nvSpPr>
+            <p:spPr>
+              <a:xfrm>
+                <a:off x="3744542" y="3162886"/>
+                <a:ext cx="328936" cy="232436"/>
+              </a:xfrm>
+              <a:prstGeom prst="rect">
+                <a:avLst/>
+              </a:prstGeom>
+              <a:blipFill rotWithShape="1">
+                <a:blip r:embed="rId53"/>
+                <a:stretch>
+                  <a:fillRect/>
+                </a:stretch>
+              </a:blipFill>
+            </p:spPr>
+            <p:txBody>
+              <a:bodyPr/>
+              <a:lstStyle/>
+              <a:p>
+                <a:r>
+                  <a:rPr lang="ko-KR" altLang="en-US">
+                    <a:noFill/>
+                  </a:rPr>
+                  <a:t> </a:t>
+                </a:r>
+              </a:p>
+            </p:txBody>
+          </p:sp>
+        </mc:Fallback>
+      </mc:AlternateContent>
+      <mc:AlternateContent xmlns:mc="http://schemas.openxmlformats.org/markup-compatibility/2006">
+        <mc:Choice xmlns:a14="http://schemas.microsoft.com/office/drawing/2010/main" Requires="a14">
+          <p:sp>
+            <p:nvSpPr>
+              <p:cNvPr id="178" name="TextBox 177"/>
+              <p:cNvSpPr txBox="1"/>
+              <p:nvPr/>
+            </p:nvSpPr>
+            <p:spPr>
+              <a:xfrm>
+                <a:off x="3780789" y="4459461"/>
+                <a:ext cx="373820" cy="233141"/>
+              </a:xfrm>
+              <a:prstGeom prst="rect">
+                <a:avLst/>
+              </a:prstGeom>
+              <a:noFill/>
+            </p:spPr>
+            <p:txBody>
+              <a:bodyPr wrap="none" rtlCol="0">
+                <a:spAutoFit/>
+              </a:bodyPr>
+              <a:lstStyle/>
+              <a:p>
+                <a:pPr/>
+                <a14:m>
+                  <m:oMathPara xmlns:m="http://schemas.openxmlformats.org/officeDocument/2006/math">
+                    <m:oMathParaPr>
+                      <m:jc m:val="centerGroup"/>
+                    </m:oMathParaPr>
+                    <m:oMath xmlns:m="http://schemas.openxmlformats.org/officeDocument/2006/math">
+                      <m:sSubSup>
+                        <m:sSubSupPr>
+                          <m:ctrlPr>
+                            <a:rPr lang="ko-KR" altLang="ko-KR" sz="900" i="1" smtClean="0">
+                              <a:latin typeface="Cambria Math"/>
+                            </a:rPr>
+                          </m:ctrlPr>
+                        </m:sSubSupPr>
+                        <m:e>
+                          <m:r>
+                            <m:rPr>
+                              <m:sty m:val="p"/>
+                            </m:rPr>
+                            <a:rPr lang="en-US" altLang="ko-KR" sz="900" b="0" i="0" smtClean="0">
+                              <a:latin typeface="Cambria Math"/>
+                            </a:rPr>
+                            <m:t>h</m:t>
+                          </m:r>
+                        </m:e>
+                        <m:sub>
+                          <m:r>
+                            <a:rPr lang="en-US" altLang="ko-KR" sz="900" b="0" i="1" smtClean="0">
+                              <a:latin typeface="Cambria Math"/>
+                            </a:rPr>
+                            <m:t>99</m:t>
+                          </m:r>
+                        </m:sub>
+                        <m:sup>
+                          <m:r>
+                            <a:rPr lang="en-US" altLang="ko-KR" sz="900" b="0" i="1" smtClean="0">
+                              <a:latin typeface="Cambria Math"/>
+                            </a:rPr>
+                            <m:t>1</m:t>
+                          </m:r>
+                        </m:sup>
+                      </m:sSubSup>
+                    </m:oMath>
+                  </m:oMathPara>
+                </a14:m>
+                <a:endParaRPr lang="ko-KR" altLang="en-US" sz="900" baseline="-25000" dirty="0"/>
+              </a:p>
+            </p:txBody>
+          </p:sp>
+        </mc:Choice>
+        <mc:Fallback>
+          <p:sp>
+            <p:nvSpPr>
+              <p:cNvPr id="178" name="TextBox 177"/>
+              <p:cNvSpPr txBox="1">
+                <a:spLocks noRot="1" noChangeAspect="1" noMove="1" noResize="1" noEditPoints="1" noAdjustHandles="1" noChangeArrowheads="1" noChangeShapeType="1" noTextEdit="1"/>
+              </p:cNvSpPr>
+              <p:nvPr/>
+            </p:nvSpPr>
+            <p:spPr>
+              <a:xfrm>
+                <a:off x="3780789" y="4459461"/>
+                <a:ext cx="373820" cy="233141"/>
+              </a:xfrm>
+              <a:prstGeom prst="rect">
+                <a:avLst/>
+              </a:prstGeom>
+              <a:blipFill rotWithShape="1">
+                <a:blip r:embed="rId54"/>
+                <a:stretch>
+                  <a:fillRect/>
+                </a:stretch>
+              </a:blipFill>
+            </p:spPr>
+            <p:txBody>
+              <a:bodyPr/>
+              <a:lstStyle/>
+              <a:p>
+                <a:r>
+                  <a:rPr lang="ko-KR" altLang="en-US">
+                    <a:noFill/>
+                  </a:rPr>
+                  <a:t> </a:t>
+                </a:r>
+              </a:p>
+            </p:txBody>
+          </p:sp>
+        </mc:Fallback>
+      </mc:AlternateContent>
+      <mc:AlternateContent xmlns:mc="http://schemas.openxmlformats.org/markup-compatibility/2006">
+        <mc:Choice xmlns:a14="http://schemas.microsoft.com/office/drawing/2010/main" Requires="a14">
+          <p:sp>
+            <p:nvSpPr>
+              <p:cNvPr id="180" name="TextBox 179"/>
+              <p:cNvSpPr txBox="1"/>
+              <p:nvPr/>
+            </p:nvSpPr>
+            <p:spPr>
+              <a:xfrm>
+                <a:off x="3705746" y="4835824"/>
+                <a:ext cx="637226" cy="233269"/>
+              </a:xfrm>
+              <a:prstGeom prst="rect">
+                <a:avLst/>
+              </a:prstGeom>
+              <a:noFill/>
+            </p:spPr>
+            <p:txBody>
+              <a:bodyPr wrap="none" rtlCol="0">
+                <a:spAutoFit/>
+              </a:bodyPr>
+              <a:lstStyle/>
+              <a:p>
+                <a:pPr/>
+                <a14:m>
+                  <m:oMathPara xmlns:m="http://schemas.openxmlformats.org/officeDocument/2006/math">
+                    <m:oMathParaPr>
+                      <m:jc m:val="centerGroup"/>
+                    </m:oMathParaPr>
+                    <m:oMath xmlns:m="http://schemas.openxmlformats.org/officeDocument/2006/math">
+                      <m:sSubSup>
+                        <m:sSubSupPr>
+                          <m:ctrlPr>
+                            <a:rPr lang="ko-KR" altLang="ko-KR" sz="900" i="1" smtClean="0">
+                              <a:latin typeface="Cambria Math"/>
+                            </a:rPr>
+                          </m:ctrlPr>
+                        </m:sSubSupPr>
+                        <m:e>
+                          <m:r>
+                            <m:rPr>
+                              <m:sty m:val="p"/>
+                            </m:rPr>
+                            <a:rPr lang="en-US" altLang="ko-KR" sz="900" b="0" i="0" smtClean="0">
+                              <a:latin typeface="Cambria Math"/>
+                            </a:rPr>
+                            <m:t>h</m:t>
+                          </m:r>
+                        </m:e>
+                        <m:sub>
+                          <m:r>
+                            <a:rPr lang="en-US" altLang="ko-KR" sz="900" b="0" i="1" smtClean="0">
+                              <a:latin typeface="Cambria Math"/>
+                            </a:rPr>
+                            <m:t>100</m:t>
+                          </m:r>
+                        </m:sub>
+                        <m:sup>
+                          <m:r>
+                            <a:rPr lang="en-US" altLang="ko-KR" sz="900" b="0" i="1" smtClean="0">
+                              <a:latin typeface="Cambria Math"/>
+                            </a:rPr>
+                            <m:t>1</m:t>
+                          </m:r>
+                        </m:sup>
+                      </m:sSubSup>
+                      <m:r>
+                        <a:rPr lang="en-US" altLang="ko-KR" sz="900" b="0" i="1" smtClean="0">
+                          <a:latin typeface="Cambria Math"/>
+                        </a:rPr>
+                        <m:t>=1</m:t>
+                      </m:r>
+                    </m:oMath>
+                  </m:oMathPara>
+                </a14:m>
+                <a:endParaRPr lang="ko-KR" altLang="en-US" sz="900" baseline="-25000" dirty="0"/>
+              </a:p>
+            </p:txBody>
+          </p:sp>
+        </mc:Choice>
+        <mc:Fallback>
+          <p:sp>
+            <p:nvSpPr>
+              <p:cNvPr id="180" name="TextBox 179"/>
+              <p:cNvSpPr txBox="1">
+                <a:spLocks noRot="1" noChangeAspect="1" noMove="1" noResize="1" noEditPoints="1" noAdjustHandles="1" noChangeArrowheads="1" noChangeShapeType="1" noTextEdit="1"/>
+              </p:cNvSpPr>
+              <p:nvPr/>
+            </p:nvSpPr>
+            <p:spPr>
+              <a:xfrm>
+                <a:off x="3705746" y="4835824"/>
+                <a:ext cx="637226" cy="233269"/>
+              </a:xfrm>
+              <a:prstGeom prst="rect">
+                <a:avLst/>
+              </a:prstGeom>
+              <a:blipFill rotWithShape="1">
+                <a:blip r:embed="rId55"/>
+                <a:stretch>
+                  <a:fillRect/>
+                </a:stretch>
+              </a:blipFill>
+            </p:spPr>
+            <p:txBody>
+              <a:bodyPr/>
+              <a:lstStyle/>
+              <a:p>
+                <a:r>
+                  <a:rPr lang="ko-KR" altLang="en-US">
+                    <a:noFill/>
+                  </a:rPr>
+                  <a:t> </a:t>
+                </a:r>
+              </a:p>
+            </p:txBody>
+          </p:sp>
+        </mc:Fallback>
+      </mc:AlternateContent>
+      <mc:AlternateContent xmlns:mc="http://schemas.openxmlformats.org/markup-compatibility/2006">
+        <mc:Choice xmlns:a14="http://schemas.microsoft.com/office/drawing/2010/main" Requires="a14">
+          <p:sp>
+            <p:nvSpPr>
+              <p:cNvPr id="203" name="직사각형 202"/>
+              <p:cNvSpPr/>
+              <p:nvPr/>
+            </p:nvSpPr>
+            <p:spPr>
+              <a:xfrm>
+                <a:off x="3124381" y="3844158"/>
+                <a:ext cx="861197" cy="236027"/>
+              </a:xfrm>
+              <a:prstGeom prst="rect">
+                <a:avLst/>
+              </a:prstGeom>
+            </p:spPr>
+            <p:txBody>
+              <a:bodyPr wrap="none">
+                <a:spAutoFit/>
+              </a:bodyPr>
+              <a:lstStyle/>
+              <a:p>
+                <a:pPr/>
+                <a14:m>
+                  <m:oMathPara xmlns:m="http://schemas.openxmlformats.org/officeDocument/2006/math">
+                    <m:oMathParaPr>
+                      <m:jc m:val="centerGroup"/>
+                    </m:oMathParaPr>
+                    <m:oMath xmlns:m="http://schemas.openxmlformats.org/officeDocument/2006/math">
+                      <m:func>
+                        <m:funcPr>
+                          <m:ctrlPr>
+                            <a:rPr lang="ko-KR" altLang="ko-KR" sz="900" i="1" smtClean="0">
+                              <a:latin typeface="Cambria Math"/>
+                            </a:rPr>
+                          </m:ctrlPr>
+                        </m:funcPr>
+                        <m:fName>
+                          <m:r>
+                            <m:rPr>
+                              <m:sty m:val="p"/>
+                            </m:rPr>
+                            <a:rPr lang="en-US" altLang="ko-KR" sz="900">
+                              <a:latin typeface="Cambria Math"/>
+                            </a:rPr>
+                            <m:t>tanh</m:t>
+                          </m:r>
+                        </m:fName>
+                        <m:e>
+                          <m:sSubSup>
+                            <m:sSubSupPr>
+                              <m:ctrlPr>
+                                <a:rPr lang="ko-KR" altLang="ko-KR" sz="900" i="1">
+                                  <a:latin typeface="Cambria Math"/>
+                                </a:rPr>
+                              </m:ctrlPr>
+                            </m:sSubSupPr>
+                            <m:e>
+                              <m:r>
+                                <m:rPr>
+                                  <m:sty m:val="p"/>
+                                </m:rPr>
+                                <a:rPr lang="en-US" altLang="ko-KR" sz="900">
+                                  <a:latin typeface="Cambria Math"/>
+                                </a:rPr>
+                                <m:t>Z</m:t>
+                              </m:r>
+                            </m:e>
+                            <m:sub>
+                              <m:r>
+                                <a:rPr lang="en-US" altLang="ko-KR" sz="900" b="0" i="1" smtClean="0">
+                                  <a:latin typeface="Cambria Math"/>
+                                </a:rPr>
+                                <m:t>𝑘</m:t>
+                              </m:r>
+                            </m:sub>
+                            <m:sup>
+                              <m:r>
+                                <a:rPr lang="en-US" altLang="ko-KR" sz="900" b="0" i="1" smtClean="0">
+                                  <a:latin typeface="Cambria Math"/>
+                                </a:rPr>
+                                <m:t>1</m:t>
+                              </m:r>
+                            </m:sup>
+                          </m:sSubSup>
+                        </m:e>
+                      </m:func>
+                      <m:r>
+                        <a:rPr lang="en-US" altLang="ko-KR" sz="900" b="0" i="1" smtClean="0">
+                          <a:latin typeface="Cambria Math"/>
+                        </a:rPr>
+                        <m:t>=</m:t>
+                      </m:r>
+                      <m:sSubSup>
+                        <m:sSubSupPr>
+                          <m:ctrlPr>
+                            <a:rPr lang="ko-KR" altLang="ko-KR" sz="900" i="1">
+                              <a:latin typeface="Cambria Math"/>
+                            </a:rPr>
+                          </m:ctrlPr>
+                        </m:sSubSupPr>
+                        <m:e>
+                          <m:r>
+                            <m:rPr>
+                              <m:sty m:val="p"/>
+                            </m:rPr>
+                            <a:rPr lang="en-US" altLang="ko-KR" sz="900">
+                              <a:latin typeface="Cambria Math"/>
+                            </a:rPr>
+                            <m:t>h</m:t>
+                          </m:r>
+                        </m:e>
+                        <m:sub>
+                          <m:r>
+                            <a:rPr lang="en-US" altLang="ko-KR" sz="900" b="0" i="1" smtClean="0">
+                              <a:latin typeface="Cambria Math"/>
+                            </a:rPr>
+                            <m:t>𝑘</m:t>
+                          </m:r>
+                        </m:sub>
+                        <m:sup>
+                          <m:r>
+                            <a:rPr lang="en-US" altLang="ko-KR" sz="900" b="0" i="1" smtClean="0">
+                              <a:latin typeface="Cambria Math"/>
+                            </a:rPr>
+                            <m:t>1</m:t>
+                          </m:r>
+                        </m:sup>
+                      </m:sSubSup>
+                    </m:oMath>
+                  </m:oMathPara>
+                </a14:m>
+                <a:endParaRPr lang="ko-KR" altLang="en-US" sz="900" dirty="0"/>
+              </a:p>
+            </p:txBody>
+          </p:sp>
+        </mc:Choice>
+        <mc:Fallback>
+          <p:sp>
+            <p:nvSpPr>
+              <p:cNvPr id="203" name="직사각형 202"/>
+              <p:cNvSpPr>
+                <a:spLocks noRot="1" noChangeAspect="1" noMove="1" noResize="1" noEditPoints="1" noAdjustHandles="1" noChangeArrowheads="1" noChangeShapeType="1" noTextEdit="1"/>
+              </p:cNvSpPr>
+              <p:nvPr/>
+            </p:nvSpPr>
+            <p:spPr>
+              <a:xfrm>
+                <a:off x="3124381" y="3844158"/>
+                <a:ext cx="861197" cy="236027"/>
+              </a:xfrm>
+              <a:prstGeom prst="rect">
+                <a:avLst/>
+              </a:prstGeom>
+              <a:blipFill rotWithShape="1">
+                <a:blip r:embed="rId56"/>
                 <a:stretch>
                   <a:fillRect/>
                 </a:stretch>

</xml_diff>